<commit_message>
video y diapositiva 8
</commit_message>
<xml_diff>
--- a/Dia 7 Y 8/Dia 7 - 8.pptx
+++ b/Dia 7 Y 8/Dia 7 - 8.pptx
@@ -5,7 +5,7 @@
     <p:sldMasterId id="2147483864" r:id="rId1"/>
   </p:sldMasterIdLst>
   <p:notesMasterIdLst>
-    <p:notesMasterId r:id="rId18"/>
+    <p:notesMasterId r:id="rId27"/>
   </p:notesMasterIdLst>
   <p:sldIdLst>
     <p:sldId id="256" r:id="rId2"/>
@@ -23,7 +23,16 @@
     <p:sldId id="271" r:id="rId14"/>
     <p:sldId id="272" r:id="rId15"/>
     <p:sldId id="273" r:id="rId16"/>
-    <p:sldId id="274" r:id="rId17"/>
+    <p:sldId id="275" r:id="rId17"/>
+    <p:sldId id="276" r:id="rId18"/>
+    <p:sldId id="283" r:id="rId19"/>
+    <p:sldId id="277" r:id="rId20"/>
+    <p:sldId id="278" r:id="rId21"/>
+    <p:sldId id="281" r:id="rId22"/>
+    <p:sldId id="282" r:id="rId23"/>
+    <p:sldId id="279" r:id="rId24"/>
+    <p:sldId id="280" r:id="rId25"/>
+    <p:sldId id="274" r:id="rId26"/>
   </p:sldIdLst>
   <p:sldSz cx="9144000" cy="6858000" type="screen4x3"/>
   <p:notesSz cx="6858000" cy="9144000"/>
@@ -224,7 +233,7 @@
             <a:fld id="{DF7F5C29-4BF1-47A8-89F8-E3DB610FA87F}" type="datetimeFigureOut">
               <a:rPr lang="es-BO" smtClean="0"/>
               <a:pPr/>
-              <a:t>03/08/2018</a:t>
+              <a:t>07/08/2018</a:t>
             </a:fld>
             <a:endParaRPr lang="es-BO"/>
           </a:p>
@@ -863,7 +872,7 @@
             <a:fld id="{1889C7BD-009C-42BA-B8A3-ED0623728783}" type="datetimeFigureOut">
               <a:rPr lang="es-BO" smtClean="0"/>
               <a:pPr/>
-              <a:t>03/08/2018</a:t>
+              <a:t>07/08/2018</a:t>
             </a:fld>
             <a:endParaRPr lang="es-BO"/>
           </a:p>
@@ -1258,7 +1267,7 @@
             <a:fld id="{1889C7BD-009C-42BA-B8A3-ED0623728783}" type="datetimeFigureOut">
               <a:rPr lang="es-BO" smtClean="0"/>
               <a:pPr/>
-              <a:t>03/08/2018</a:t>
+              <a:t>07/08/2018</a:t>
             </a:fld>
             <a:endParaRPr lang="es-BO"/>
           </a:p>
@@ -1793,7 +1802,7 @@
             <a:fld id="{1889C7BD-009C-42BA-B8A3-ED0623728783}" type="datetimeFigureOut">
               <a:rPr lang="es-BO" smtClean="0"/>
               <a:pPr/>
-              <a:t>03/08/2018</a:t>
+              <a:t>07/08/2018</a:t>
             </a:fld>
             <a:endParaRPr lang="es-BO"/>
           </a:p>
@@ -1927,7 +1936,7 @@
             <a:fld id="{1889C7BD-009C-42BA-B8A3-ED0623728783}" type="datetimeFigureOut">
               <a:rPr lang="es-BO" smtClean="0"/>
               <a:pPr/>
-              <a:t>03/08/2018</a:t>
+              <a:t>07/08/2018</a:t>
             </a:fld>
             <a:endParaRPr lang="es-BO"/>
           </a:p>
@@ -2472,7 +2481,7 @@
             <a:fld id="{1889C7BD-009C-42BA-B8A3-ED0623728783}" type="datetimeFigureOut">
               <a:rPr lang="es-BO" smtClean="0"/>
               <a:pPr/>
-              <a:t>03/08/2018</a:t>
+              <a:t>07/08/2018</a:t>
             </a:fld>
             <a:endParaRPr lang="es-BO"/>
           </a:p>
@@ -2769,7 +2778,7 @@
             <a:fld id="{1889C7BD-009C-42BA-B8A3-ED0623728783}" type="datetimeFigureOut">
               <a:rPr lang="es-BO" smtClean="0"/>
               <a:pPr/>
-              <a:t>03/08/2018</a:t>
+              <a:t>07/08/2018</a:t>
             </a:fld>
             <a:endParaRPr lang="es-BO"/>
           </a:p>
@@ -3430,7 +3439,7 @@
             <a:fld id="{1889C7BD-009C-42BA-B8A3-ED0623728783}" type="datetimeFigureOut">
               <a:rPr lang="es-BO" smtClean="0"/>
               <a:pPr/>
-              <a:t>03/08/2018</a:t>
+              <a:t>07/08/2018</a:t>
             </a:fld>
             <a:endParaRPr lang="es-BO"/>
           </a:p>
@@ -3868,7 +3877,7 @@
             <a:fld id="{1889C7BD-009C-42BA-B8A3-ED0623728783}" type="datetimeFigureOut">
               <a:rPr lang="es-BO" smtClean="0"/>
               <a:pPr/>
-              <a:t>03/08/2018</a:t>
+              <a:t>07/08/2018</a:t>
             </a:fld>
             <a:endParaRPr lang="es-BO"/>
           </a:p>
@@ -4183,7 +4192,7 @@
             <a:fld id="{1889C7BD-009C-42BA-B8A3-ED0623728783}" type="datetimeFigureOut">
               <a:rPr lang="es-BO" smtClean="0"/>
               <a:pPr/>
-              <a:t>03/08/2018</a:t>
+              <a:t>07/08/2018</a:t>
             </a:fld>
             <a:endParaRPr lang="es-BO"/>
           </a:p>
@@ -4918,7 +4927,7 @@
             <a:fld id="{1889C7BD-009C-42BA-B8A3-ED0623728783}" type="datetimeFigureOut">
               <a:rPr lang="es-BO" smtClean="0"/>
               <a:pPr/>
-              <a:t>03/08/2018</a:t>
+              <a:t>07/08/2018</a:t>
             </a:fld>
             <a:endParaRPr lang="es-BO"/>
           </a:p>
@@ -5584,7 +5593,7 @@
             <a:fld id="{1889C7BD-009C-42BA-B8A3-ED0623728783}" type="datetimeFigureOut">
               <a:rPr lang="es-BO" smtClean="0"/>
               <a:pPr/>
-              <a:t>03/08/2018</a:t>
+              <a:t>07/08/2018</a:t>
             </a:fld>
             <a:endParaRPr lang="es-BO"/>
           </a:p>
@@ -5858,7 +5867,7 @@
             <a:fld id="{1889C7BD-009C-42BA-B8A3-ED0623728783}" type="datetimeFigureOut">
               <a:rPr lang="es-BO" smtClean="0"/>
               <a:pPr/>
-              <a:t>03/08/2018</a:t>
+              <a:t>07/08/2018</a:t>
             </a:fld>
             <a:endParaRPr lang="es-BO"/>
           </a:p>
@@ -9049,8 +9058,8 @@
         </p:nvSpPr>
         <p:spPr>
           <a:xfrm>
-            <a:off x="395536" y="1595093"/>
-            <a:ext cx="8427789" cy="4786235"/>
+            <a:off x="179512" y="1595093"/>
+            <a:ext cx="8643813" cy="4786235"/>
           </a:xfrm>
         </p:spPr>
         <p:txBody>
@@ -9074,7 +9083,7 @@
             </a:r>
           </a:p>
           <a:p>
-            <a:pPr eaLnBrk="1" hangingPunct="1">
+            <a:pPr marL="174625" indent="-93663" eaLnBrk="1" hangingPunct="1">
               <a:lnSpc>
                 <a:spcPct val="80000"/>
               </a:lnSpc>
@@ -9091,7 +9100,7 @@
             </a:r>
           </a:p>
           <a:p>
-            <a:pPr eaLnBrk="1" hangingPunct="1">
+            <a:pPr marL="174625" indent="-93663" eaLnBrk="1" hangingPunct="1">
               <a:lnSpc>
                 <a:spcPct val="80000"/>
               </a:lnSpc>
@@ -9118,7 +9127,7 @@
             </a:r>
           </a:p>
           <a:p>
-            <a:pPr eaLnBrk="1" hangingPunct="1">
+            <a:pPr marL="174625" indent="-93663" eaLnBrk="1" hangingPunct="1">
               <a:lnSpc>
                 <a:spcPct val="80000"/>
               </a:lnSpc>
@@ -9135,7 +9144,7 @@
             </a:r>
           </a:p>
           <a:p>
-            <a:pPr eaLnBrk="1" hangingPunct="1">
+            <a:pPr marL="174625" indent="-93663" eaLnBrk="1" hangingPunct="1">
               <a:lnSpc>
                 <a:spcPct val="80000"/>
               </a:lnSpc>
@@ -9148,7 +9157,7 @@
                 <a:latin typeface="Times New Roman" pitchFamily="18" charset="0"/>
                 <a:cs typeface="Times New Roman" pitchFamily="18" charset="0"/>
               </a:rPr>
-              <a:t>  	         </a:t>
+              <a:t>  	</a:t>
             </a:r>
             <a:r>
               <a:rPr lang="es-ES" sz="2400" b="1" dirty="0" smtClean="0">
@@ -9162,7 +9171,7 @@
             </a:r>
           </a:p>
           <a:p>
-            <a:pPr eaLnBrk="1" hangingPunct="1">
+            <a:pPr marL="174625" indent="-93663" eaLnBrk="1" hangingPunct="1">
               <a:lnSpc>
                 <a:spcPct val="80000"/>
               </a:lnSpc>
@@ -9179,7 +9188,7 @@
             </a:r>
           </a:p>
           <a:p>
-            <a:pPr eaLnBrk="1" hangingPunct="1">
+            <a:pPr marL="174625" indent="-93663" eaLnBrk="1" hangingPunct="1">
               <a:lnSpc>
                 <a:spcPct val="80000"/>
               </a:lnSpc>
@@ -9206,7 +9215,7 @@
             </a:r>
           </a:p>
           <a:p>
-            <a:pPr eaLnBrk="1" hangingPunct="1">
+            <a:pPr marL="174625" indent="-93663" eaLnBrk="1" hangingPunct="1">
               <a:lnSpc>
                 <a:spcPct val="80000"/>
               </a:lnSpc>
@@ -9223,7 +9232,7 @@
             </a:r>
           </a:p>
           <a:p>
-            <a:pPr eaLnBrk="1" hangingPunct="1">
+            <a:pPr marL="174625" indent="-93663" eaLnBrk="1" hangingPunct="1">
               <a:lnSpc>
                 <a:spcPct val="80000"/>
               </a:lnSpc>
@@ -9236,7 +9245,7 @@
                 <a:latin typeface="Times New Roman" pitchFamily="18" charset="0"/>
                 <a:cs typeface="Times New Roman" pitchFamily="18" charset="0"/>
               </a:rPr>
-              <a:t>         </a:t>
+              <a:t>        </a:t>
             </a:r>
             <a:r>
               <a:rPr lang="es-ES" sz="2400" b="1" dirty="0" smtClean="0">
@@ -9246,11 +9255,11 @@
                 <a:latin typeface="Times New Roman" pitchFamily="18" charset="0"/>
                 <a:cs typeface="Times New Roman" pitchFamily="18" charset="0"/>
               </a:rPr>
-              <a:t>template1=#create user prueba with encrypted password     ‘prueba’;</a:t>
-            </a:r>
-          </a:p>
-          <a:p>
-            <a:pPr>
+              <a:t>template1=#create user prueba with encrypted password          		    ‘prueba’;</a:t>
+            </a:r>
+          </a:p>
+          <a:p>
+            <a:pPr marL="174625" indent="-93663">
               <a:lnSpc>
                 <a:spcPct val="80000"/>
               </a:lnSpc>
@@ -9277,7 +9286,7 @@
             </a:endParaRPr>
           </a:p>
           <a:p>
-            <a:pPr>
+            <a:pPr marL="174625" indent="-93663">
               <a:lnSpc>
                 <a:spcPct val="80000"/>
               </a:lnSpc>
@@ -9484,18 +9493,18 @@
       </p:grpSpPr>
       <p:sp>
         <p:nvSpPr>
-          <p:cNvPr id="3" name="2 Marcador de contenido"/>
+          <p:cNvPr id="4" name="Rectangle 2"/>
           <p:cNvSpPr>
-            <a:spLocks noGrp="1"/>
+            <a:spLocks noGrp="1" noChangeArrowheads="1"/>
           </p:cNvSpPr>
           <p:nvPr>
-            <p:ph sz="quarter" idx="1"/>
+            <p:ph idx="1"/>
           </p:nvPr>
         </p:nvSpPr>
         <p:spPr>
           <a:xfrm>
-            <a:off x="323528" y="1556792"/>
-            <a:ext cx="8640960" cy="5473844"/>
+            <a:off x="251520" y="1700808"/>
+            <a:ext cx="8609043" cy="5302942"/>
           </a:xfrm>
         </p:spPr>
         <p:txBody>
@@ -9504,203 +9513,131 @@
           </a:bodyPr>
           <a:lstStyle/>
           <a:p>
-            <a:pPr algn="just"/>
-            <a:r>
-              <a:rPr lang="es-BO" sz="2200" dirty="0" smtClean="0">
-                <a:latin typeface="Times New Roman" panose="02020603050405020304" pitchFamily="18" charset="0"/>
-                <a:cs typeface="Times New Roman" panose="02020603050405020304" pitchFamily="18" charset="0"/>
-              </a:rPr>
-              <a:t>Para poder eliminar un objeto  ya sea base de datos, usuarios, tablas se utiliza el comando DROP de la siguiente manera:</a:t>
+            <a:pPr algn="just">
+              <a:defRPr/>
+            </a:pPr>
+            <a:r>
+              <a:rPr lang="es-ES" sz="2800" dirty="0" smtClean="0">
+                <a:latin typeface="Times New Roman" pitchFamily="18" charset="0"/>
+                <a:cs typeface="Times New Roman" pitchFamily="18" charset="0"/>
+              </a:rPr>
+              <a:t>Después de ingresar  al servidor de postgres creamos el usuario prueba con password .prueba. ,de la siguiente manera</a:t>
             </a:r>
           </a:p>
           <a:p>
             <a:pPr algn="just">
               <a:buNone/>
-            </a:pPr>
-            <a:r>
-              <a:rPr lang="en-US" sz="2200" b="1" dirty="0" smtClean="0">
-                <a:latin typeface="Times New Roman" panose="02020603050405020304" pitchFamily="18" charset="0"/>
-                <a:cs typeface="Times New Roman" panose="02020603050405020304" pitchFamily="18" charset="0"/>
-              </a:rPr>
-              <a:t>	DROP </a:t>
-            </a:r>
-            <a:r>
-              <a:rPr lang="en-US" sz="2200" b="1" dirty="0" smtClean="0">
-                <a:latin typeface="Times New Roman" panose="02020603050405020304" pitchFamily="18" charset="0"/>
-                <a:cs typeface="Times New Roman" panose="02020603050405020304" pitchFamily="18" charset="0"/>
-              </a:rPr>
-              <a:t>DATABASE [NOMBRE DE LA BASE DE DATOS];</a:t>
+              <a:defRPr/>
+            </a:pPr>
+            <a:r>
+              <a:rPr lang="es-ES" sz="2800" dirty="0" smtClean="0">
+                <a:latin typeface="Times New Roman" pitchFamily="18" charset="0"/>
+                <a:cs typeface="Times New Roman" pitchFamily="18" charset="0"/>
+              </a:rPr>
+              <a:t>   </a:t>
+            </a:r>
+            <a:r>
+              <a:rPr lang="es-ES" sz="2800" dirty="0" smtClean="0">
+                <a:solidFill>
+                  <a:srgbClr val="0070C0"/>
+                </a:solidFill>
+                <a:latin typeface="Times New Roman" pitchFamily="18" charset="0"/>
+                <a:cs typeface="Times New Roman" pitchFamily="18" charset="0"/>
+              </a:rPr>
+              <a:t>CREATE USER PRUEBA WITH ENCRYPTED                  PASSWORD </a:t>
+            </a:r>
+            <a:r>
+              <a:rPr lang="en-US" sz="2800" dirty="0" smtClean="0">
+                <a:solidFill>
+                  <a:srgbClr val="0070C0"/>
+                </a:solidFill>
+                <a:latin typeface="Times New Roman" pitchFamily="18" charset="0"/>
+                <a:cs typeface="Times New Roman" pitchFamily="18" charset="0"/>
+              </a:rPr>
+              <a:t>‘PRUEBA’;</a:t>
+            </a:r>
+            <a:endParaRPr lang="es-ES" sz="2800" dirty="0" smtClean="0">
+              <a:latin typeface="Times New Roman" pitchFamily="18" charset="0"/>
+              <a:cs typeface="Times New Roman" pitchFamily="18" charset="0"/>
+            </a:endParaRPr>
+          </a:p>
+          <a:p>
+            <a:pPr algn="just">
+              <a:defRPr/>
+            </a:pPr>
+            <a:r>
+              <a:rPr lang="es-ES" sz="2800" dirty="0" smtClean="0">
+                <a:latin typeface="Times New Roman" pitchFamily="18" charset="0"/>
+                <a:cs typeface="Times New Roman" pitchFamily="18" charset="0"/>
+              </a:rPr>
+              <a:t>Luego creamos la base de datos llamada prueba </a:t>
+            </a:r>
+          </a:p>
+          <a:p>
+            <a:pPr algn="just">
+              <a:defRPr/>
+            </a:pPr>
+            <a:endParaRPr lang="es-ES" sz="2800" dirty="0" smtClean="0">
+              <a:latin typeface="Times New Roman" pitchFamily="18" charset="0"/>
+              <a:cs typeface="Times New Roman" pitchFamily="18" charset="0"/>
+            </a:endParaRPr>
+          </a:p>
+          <a:p>
+            <a:pPr algn="just">
+              <a:buNone/>
+              <a:defRPr/>
+            </a:pPr>
+            <a:r>
+              <a:rPr lang="es-ES" sz="2800" dirty="0" smtClean="0">
+                <a:latin typeface="Times New Roman" pitchFamily="18" charset="0"/>
+                <a:cs typeface="Times New Roman" pitchFamily="18" charset="0"/>
+              </a:rPr>
+              <a:t>    </a:t>
+            </a:r>
+            <a:r>
+              <a:rPr lang="es-ES" sz="2800" dirty="0" smtClean="0">
+                <a:solidFill>
+                  <a:srgbClr val="0070C0"/>
+                </a:solidFill>
+                <a:latin typeface="Times New Roman" pitchFamily="18" charset="0"/>
+                <a:cs typeface="Times New Roman" pitchFamily="18" charset="0"/>
+              </a:rPr>
+              <a:t>CREATE DATABASE PRUEBA;</a:t>
             </a:r>
           </a:p>
           <a:p>
             <a:pPr>
+              <a:lnSpc>
+                <a:spcPct val="80000"/>
+              </a:lnSpc>
               <a:buNone/>
-            </a:pPr>
-            <a:r>
-              <a:rPr lang="en-US" sz="2200" b="1" dirty="0" smtClean="0">
-                <a:latin typeface="Times New Roman" panose="02020603050405020304" pitchFamily="18" charset="0"/>
-                <a:cs typeface="Times New Roman" panose="02020603050405020304" pitchFamily="18" charset="0"/>
-              </a:rPr>
-              <a:t>	DROP </a:t>
-            </a:r>
-            <a:r>
-              <a:rPr lang="en-US" sz="2200" b="1" dirty="0" smtClean="0">
-                <a:latin typeface="Times New Roman" panose="02020603050405020304" pitchFamily="18" charset="0"/>
-                <a:cs typeface="Times New Roman" panose="02020603050405020304" pitchFamily="18" charset="0"/>
-              </a:rPr>
-              <a:t>USUARIO[NOMBRE DEL USUARIO];</a:t>
-            </a:r>
-          </a:p>
-          <a:p>
-            <a:pPr>
+              <a:defRPr/>
+            </a:pPr>
+            <a:endParaRPr lang="es-ES" sz="2800" b="1" dirty="0" smtClean="0">
+              <a:latin typeface="Times New Roman" pitchFamily="18" charset="0"/>
+              <a:cs typeface="Times New Roman" pitchFamily="18" charset="0"/>
+            </a:endParaRPr>
+          </a:p>
+          <a:p>
+            <a:pPr eaLnBrk="1" hangingPunct="1">
+              <a:lnSpc>
+                <a:spcPct val="80000"/>
+              </a:lnSpc>
               <a:buNone/>
-            </a:pPr>
-            <a:r>
-              <a:rPr lang="en-US" sz="2200" b="1" dirty="0" smtClean="0">
-                <a:latin typeface="Times New Roman" panose="02020603050405020304" pitchFamily="18" charset="0"/>
-                <a:cs typeface="Times New Roman" panose="02020603050405020304" pitchFamily="18" charset="0"/>
-              </a:rPr>
-              <a:t>	DROP </a:t>
-            </a:r>
-            <a:r>
-              <a:rPr lang="en-US" sz="2200" b="1" dirty="0" smtClean="0">
-                <a:latin typeface="Times New Roman" panose="02020603050405020304" pitchFamily="18" charset="0"/>
-                <a:cs typeface="Times New Roman" panose="02020603050405020304" pitchFamily="18" charset="0"/>
-              </a:rPr>
-              <a:t>TABLE[NOMBRE DE LA TABLA];</a:t>
-            </a:r>
-            <a:endParaRPr lang="es-BO" sz="2200" b="1" dirty="0" smtClean="0">
-              <a:latin typeface="Times New Roman" panose="02020603050405020304" pitchFamily="18" charset="0"/>
-              <a:cs typeface="Times New Roman" panose="02020603050405020304" pitchFamily="18" charset="0"/>
-            </a:endParaRPr>
-          </a:p>
-          <a:p>
-            <a:r>
-              <a:rPr lang="es-BO" sz="2200" dirty="0" smtClean="0">
-                <a:latin typeface="Times New Roman" panose="02020603050405020304" pitchFamily="18" charset="0"/>
-                <a:cs typeface="Times New Roman" panose="02020603050405020304" pitchFamily="18" charset="0"/>
-              </a:rPr>
-              <a:t>Para poder modificar datos de un objeto ya sea base de datos usuarios, tablas se utiliza la sentencia ALTER</a:t>
-            </a:r>
-          </a:p>
-          <a:p>
-            <a:pPr>
+              <a:defRPr/>
+            </a:pPr>
+            <a:endParaRPr lang="es-ES" sz="2400" dirty="0" smtClean="0"/>
+          </a:p>
+          <a:p>
+            <a:pPr eaLnBrk="1" hangingPunct="1">
+              <a:lnSpc>
+                <a:spcPct val="80000"/>
+              </a:lnSpc>
+              <a:buFont typeface="Wingdings" pitchFamily="2" charset="2"/>
               <a:buNone/>
-            </a:pPr>
-            <a:r>
-              <a:rPr lang="es-BO" sz="2200" b="1" dirty="0" smtClean="0">
-                <a:latin typeface="Times New Roman" panose="02020603050405020304" pitchFamily="18" charset="0"/>
-                <a:cs typeface="Times New Roman" panose="02020603050405020304" pitchFamily="18" charset="0"/>
-              </a:rPr>
-              <a:t>	ALTER  </a:t>
-            </a:r>
-            <a:r>
-              <a:rPr lang="es-BO" sz="2200" b="1" dirty="0" smtClean="0">
-                <a:latin typeface="Times New Roman" panose="02020603050405020304" pitchFamily="18" charset="0"/>
-                <a:cs typeface="Times New Roman" panose="02020603050405020304" pitchFamily="18" charset="0"/>
-              </a:rPr>
-              <a:t>USER prueba RENAME prueba1;</a:t>
-            </a:r>
-          </a:p>
-          <a:p>
-            <a:pPr>
-              <a:buNone/>
-            </a:pPr>
-            <a:r>
-              <a:rPr lang="es-BO" sz="2200" b="1" dirty="0" smtClean="0">
-                <a:latin typeface="Times New Roman" panose="02020603050405020304" pitchFamily="18" charset="0"/>
-                <a:cs typeface="Times New Roman" panose="02020603050405020304" pitchFamily="18" charset="0"/>
-              </a:rPr>
-              <a:t>	ALTER  </a:t>
-            </a:r>
-            <a:r>
-              <a:rPr lang="es-BO" sz="2200" b="1" dirty="0" smtClean="0">
-                <a:latin typeface="Times New Roman" panose="02020603050405020304" pitchFamily="18" charset="0"/>
-                <a:cs typeface="Times New Roman" panose="02020603050405020304" pitchFamily="18" charset="0"/>
-              </a:rPr>
-              <a:t>ROLE "prueba" PASSWORD 'prueba';</a:t>
-            </a:r>
-          </a:p>
-          <a:p>
-            <a:pPr>
-              <a:buNone/>
-            </a:pPr>
-            <a:r>
-              <a:rPr lang="es-BO" sz="2200" b="1" dirty="0" smtClean="0">
-                <a:latin typeface="Times New Roman" panose="02020603050405020304" pitchFamily="18" charset="0"/>
-                <a:cs typeface="Times New Roman" panose="02020603050405020304" pitchFamily="18" charset="0"/>
-              </a:rPr>
-              <a:t>	ALTER  </a:t>
-            </a:r>
-            <a:r>
-              <a:rPr lang="es-BO" sz="2200" b="1" dirty="0" smtClean="0">
-                <a:latin typeface="Times New Roman" panose="02020603050405020304" pitchFamily="18" charset="0"/>
-                <a:cs typeface="Times New Roman" panose="02020603050405020304" pitchFamily="18" charset="0"/>
-              </a:rPr>
-              <a:t>USER "prueba" PASSWORD 'prueba';</a:t>
-            </a:r>
-          </a:p>
-          <a:p>
-            <a:pPr>
-              <a:buNone/>
-            </a:pPr>
-            <a:r>
-              <a:rPr lang="es-BO" sz="2200" b="1" dirty="0" smtClean="0">
-                <a:latin typeface="Times New Roman" panose="02020603050405020304" pitchFamily="18" charset="0"/>
-                <a:cs typeface="Times New Roman" panose="02020603050405020304" pitchFamily="18" charset="0"/>
-              </a:rPr>
-              <a:t>	ALTER  </a:t>
-            </a:r>
-            <a:r>
-              <a:rPr lang="es-BO" sz="2200" b="1" dirty="0" smtClean="0">
-                <a:latin typeface="Times New Roman" panose="02020603050405020304" pitchFamily="18" charset="0"/>
-                <a:cs typeface="Times New Roman" panose="02020603050405020304" pitchFamily="18" charset="0"/>
-              </a:rPr>
-              <a:t>DATABASE prueba RENAME prueba1;</a:t>
-            </a:r>
-          </a:p>
-          <a:p>
-            <a:pPr>
-              <a:buNone/>
-            </a:pPr>
-            <a:r>
-              <a:rPr lang="es-BO" sz="2200" b="1" dirty="0" smtClean="0">
-                <a:latin typeface="Times New Roman" panose="02020603050405020304" pitchFamily="18" charset="0"/>
-                <a:cs typeface="Times New Roman" panose="02020603050405020304" pitchFamily="18" charset="0"/>
-              </a:rPr>
-              <a:t>	ALTER  </a:t>
-            </a:r>
-            <a:r>
-              <a:rPr lang="es-BO" sz="2200" b="1" dirty="0" smtClean="0">
-                <a:latin typeface="Times New Roman" panose="02020603050405020304" pitchFamily="18" charset="0"/>
-                <a:cs typeface="Times New Roman" panose="02020603050405020304" pitchFamily="18" charset="0"/>
-              </a:rPr>
-              <a:t>TABLE prueba RENAME prueba1;</a:t>
-            </a:r>
-          </a:p>
-          <a:p>
-            <a:pPr>
-              <a:buNone/>
-            </a:pPr>
-            <a:endParaRPr lang="es-BO" dirty="0" smtClean="0"/>
-          </a:p>
-          <a:p>
-            <a:pPr>
-              <a:buNone/>
-            </a:pPr>
-            <a:endParaRPr lang="es-BO" dirty="0" smtClean="0"/>
-          </a:p>
-          <a:p>
-            <a:pPr>
-              <a:buNone/>
-            </a:pPr>
-            <a:endParaRPr lang="es-BO" dirty="0" smtClean="0"/>
-          </a:p>
-          <a:p>
-            <a:pPr>
-              <a:buNone/>
-            </a:pPr>
-            <a:endParaRPr lang="es-BO" dirty="0"/>
+              <a:defRPr/>
+            </a:pPr>
+            <a:endParaRPr lang="es-ES" sz="2000" dirty="0" smtClean="0"/>
           </a:p>
         </p:txBody>
       </p:sp>
@@ -9712,8 +9649,8 @@
         </p:nvSpPr>
         <p:spPr>
           <a:xfrm>
-            <a:off x="1355928" y="332656"/>
-            <a:ext cx="6795450" cy="615553"/>
+            <a:off x="1331640" y="116632"/>
+            <a:ext cx="6828813" cy="1015663"/>
           </a:xfrm>
           <a:prstGeom prst="rect">
             <a:avLst/>
@@ -9721,14 +9658,14 @@
           <a:noFill/>
         </p:spPr>
         <p:txBody>
-          <a:bodyPr wrap="none" lIns="91440" tIns="45720" rIns="91440" bIns="45720">
+          <a:bodyPr wrap="square" lIns="91440" tIns="45720" rIns="91440" bIns="45720">
             <a:spAutoFit/>
           </a:bodyPr>
           <a:lstStyle/>
           <a:p>
             <a:pPr algn="ctr"/>
             <a:r>
-              <a:rPr lang="es-ES" sz="3400" b="1" spc="50" dirty="0" smtClean="0">
+              <a:rPr lang="es-ES" sz="3000" b="1" spc="50" dirty="0" smtClean="0">
                 <a:ln w="0"/>
                 <a:solidFill>
                   <a:srgbClr val="C00000"/>
@@ -9743,9 +9680,9 @@
                 <a:latin typeface="Times New Roman" panose="02020603050405020304" pitchFamily="18" charset="0"/>
                 <a:cs typeface="Times New Roman" panose="02020603050405020304" pitchFamily="18" charset="0"/>
               </a:rPr>
-              <a:t>POSTGRES:ADMINISTRACION</a:t>
-            </a:r>
-            <a:endParaRPr lang="es-BO" sz="3400" b="1" spc="50" dirty="0">
+              <a:t>POSTGRES:ADMINISTRACION DE USUARIOS</a:t>
+            </a:r>
+            <a:endParaRPr lang="es-BO" sz="3000" b="1" spc="50" dirty="0">
               <a:ln w="0"/>
               <a:solidFill>
                 <a:srgbClr val="C00000"/>
@@ -9766,7 +9703,989 @@
     </p:spTree>
     <p:extLst>
       <p:ext uri="{BB962C8B-B14F-4D97-AF65-F5344CB8AC3E}">
-        <p14:creationId xmlns:p14="http://schemas.microsoft.com/office/powerpoint/2010/main" val="656651701"/>
+        <p14:creationId xmlns:p14="http://schemas.microsoft.com/office/powerpoint/2010/main" val="2752516635"/>
+      </p:ext>
+    </p:extLst>
+  </p:cSld>
+  <p:clrMapOvr>
+    <a:masterClrMapping/>
+  </p:clrMapOvr>
+  <p:timing>
+    <p:tnLst>
+      <p:par>
+        <p:cTn id="1" dur="indefinite" restart="never" nodeType="tmRoot"/>
+      </p:par>
+    </p:tnLst>
+  </p:timing>
+</p:sld>
+</file>
+
+<file path=ppt/slides/slide17.xml><?xml version="1.0" encoding="utf-8"?>
+<p:sld xmlns:a="http://schemas.openxmlformats.org/drawingml/2006/main" xmlns:r="http://schemas.openxmlformats.org/officeDocument/2006/relationships" xmlns:p="http://schemas.openxmlformats.org/presentationml/2006/main">
+  <p:cSld>
+    <p:spTree>
+      <p:nvGrpSpPr>
+        <p:cNvPr id="1" name=""/>
+        <p:cNvGrpSpPr/>
+        <p:nvPr/>
+      </p:nvGrpSpPr>
+      <p:grpSpPr>
+        <a:xfrm>
+          <a:off x="0" y="0"/>
+          <a:ext cx="0" cy="0"/>
+          <a:chOff x="0" y="0"/>
+          <a:chExt cx="0" cy="0"/>
+        </a:xfrm>
+      </p:grpSpPr>
+      <p:sp>
+        <p:nvSpPr>
+          <p:cNvPr id="4" name="Rectangle 2"/>
+          <p:cNvSpPr>
+            <a:spLocks noGrp="1" noChangeArrowheads="1"/>
+          </p:cNvSpPr>
+          <p:nvPr>
+            <p:ph idx="1"/>
+          </p:nvPr>
+        </p:nvSpPr>
+        <p:spPr>
+          <a:xfrm>
+            <a:off x="395536" y="1700808"/>
+            <a:ext cx="8427789" cy="4680520"/>
+          </a:xfrm>
+        </p:spPr>
+        <p:txBody>
+          <a:bodyPr>
+            <a:normAutofit lnSpcReduction="10000"/>
+          </a:bodyPr>
+          <a:lstStyle/>
+          <a:p>
+            <a:pPr algn="just">
+              <a:lnSpc>
+                <a:spcPct val="80000"/>
+              </a:lnSpc>
+              <a:buNone/>
+              <a:defRPr/>
+            </a:pPr>
+            <a:r>
+              <a:rPr lang="es-ES" sz="2600" dirty="0">
+                <a:latin typeface="Times New Roman" pitchFamily="18" charset="0"/>
+                <a:cs typeface="Times New Roman" pitchFamily="18" charset="0"/>
+              </a:rPr>
+              <a:t>Para crear usuarios existen tipos de privilegios como por </a:t>
+            </a:r>
+            <a:r>
+              <a:rPr lang="es-ES" sz="2600" dirty="0" smtClean="0">
+                <a:latin typeface="Times New Roman" pitchFamily="18" charset="0"/>
+                <a:cs typeface="Times New Roman" pitchFamily="18" charset="0"/>
+              </a:rPr>
+              <a:t>ejemplo.</a:t>
+            </a:r>
+          </a:p>
+          <a:p>
+            <a:pPr algn="just">
+              <a:lnSpc>
+                <a:spcPct val="80000"/>
+              </a:lnSpc>
+              <a:buNone/>
+              <a:defRPr/>
+            </a:pPr>
+            <a:endParaRPr lang="es-ES" sz="2600" dirty="0" smtClean="0">
+              <a:latin typeface="Times New Roman" pitchFamily="18" charset="0"/>
+              <a:cs typeface="Times New Roman" pitchFamily="18" charset="0"/>
+            </a:endParaRPr>
+          </a:p>
+          <a:p>
+            <a:pPr algn="just">
+              <a:lnSpc>
+                <a:spcPct val="80000"/>
+              </a:lnSpc>
+              <a:buFont typeface="Courier New" pitchFamily="49" charset="0"/>
+              <a:buChar char="o"/>
+              <a:defRPr/>
+            </a:pPr>
+            <a:r>
+              <a:rPr lang="es-ES" sz="2400" b="1" dirty="0" smtClean="0">
+                <a:latin typeface="Times New Roman" pitchFamily="18" charset="0"/>
+                <a:cs typeface="Times New Roman" pitchFamily="18" charset="0"/>
+              </a:rPr>
+              <a:t>SUPERUSER       &gt; privilegio </a:t>
+            </a:r>
+            <a:r>
+              <a:rPr lang="es-ES" sz="2400" b="1" dirty="0">
+                <a:latin typeface="Times New Roman" pitchFamily="18" charset="0"/>
+                <a:cs typeface="Times New Roman" pitchFamily="18" charset="0"/>
+              </a:rPr>
+              <a:t>de </a:t>
+            </a:r>
+            <a:r>
+              <a:rPr lang="es-ES" sz="2400" b="1" dirty="0" smtClean="0">
+                <a:latin typeface="Times New Roman" pitchFamily="18" charset="0"/>
+                <a:cs typeface="Times New Roman" pitchFamily="18" charset="0"/>
+              </a:rPr>
+              <a:t>súper usuario</a:t>
+            </a:r>
+          </a:p>
+          <a:p>
+            <a:pPr algn="just">
+              <a:lnSpc>
+                <a:spcPct val="80000"/>
+              </a:lnSpc>
+              <a:buFont typeface="Courier New" pitchFamily="49" charset="0"/>
+              <a:buChar char="o"/>
+              <a:defRPr/>
+            </a:pPr>
+            <a:r>
+              <a:rPr lang="es-ES" sz="2400" b="1" dirty="0" smtClean="0">
+                <a:latin typeface="Times New Roman" pitchFamily="18" charset="0"/>
+                <a:cs typeface="Times New Roman" pitchFamily="18" charset="0"/>
+              </a:rPr>
+              <a:t>CREATEDB         &gt; </a:t>
+            </a:r>
+            <a:r>
+              <a:rPr lang="es-ES" sz="2400" b="1" dirty="0">
+                <a:latin typeface="Times New Roman" pitchFamily="18" charset="0"/>
+                <a:cs typeface="Times New Roman" pitchFamily="18" charset="0"/>
+              </a:rPr>
+              <a:t>permiso para crear bases de </a:t>
+            </a:r>
+            <a:r>
+              <a:rPr lang="es-ES" sz="2400" b="1" dirty="0" smtClean="0">
+                <a:latin typeface="Times New Roman" pitchFamily="18" charset="0"/>
+                <a:cs typeface="Times New Roman" pitchFamily="18" charset="0"/>
+              </a:rPr>
+              <a:t>datos</a:t>
+            </a:r>
+          </a:p>
+          <a:p>
+            <a:pPr algn="just">
+              <a:lnSpc>
+                <a:spcPct val="80000"/>
+              </a:lnSpc>
+              <a:buFont typeface="Courier New" pitchFamily="49" charset="0"/>
+              <a:buChar char="o"/>
+              <a:defRPr/>
+            </a:pPr>
+            <a:r>
+              <a:rPr lang="es-ES" sz="2400" b="1" dirty="0" smtClean="0">
+                <a:latin typeface="Times New Roman" pitchFamily="18" charset="0"/>
+                <a:cs typeface="Times New Roman" pitchFamily="18" charset="0"/>
+              </a:rPr>
+              <a:t>CREATE </a:t>
+            </a:r>
+            <a:r>
+              <a:rPr lang="es-ES" sz="2400" b="1" dirty="0">
+                <a:latin typeface="Times New Roman" pitchFamily="18" charset="0"/>
+                <a:cs typeface="Times New Roman" pitchFamily="18" charset="0"/>
+              </a:rPr>
+              <a:t>ROLE </a:t>
+            </a:r>
+            <a:r>
+              <a:rPr lang="es-ES" sz="2400" b="1" dirty="0" smtClean="0">
+                <a:latin typeface="Times New Roman" pitchFamily="18" charset="0"/>
+                <a:cs typeface="Times New Roman" pitchFamily="18" charset="0"/>
+              </a:rPr>
+              <a:t> &gt; </a:t>
+            </a:r>
+            <a:r>
+              <a:rPr lang="es-ES" sz="2400" b="1" dirty="0">
+                <a:latin typeface="Times New Roman" pitchFamily="18" charset="0"/>
+                <a:cs typeface="Times New Roman" pitchFamily="18" charset="0"/>
+              </a:rPr>
+              <a:t>permiso para crear usuarios</a:t>
+            </a:r>
+            <a:r>
+              <a:rPr lang="es-ES" sz="2600" b="1" dirty="0">
+                <a:latin typeface="Times New Roman" pitchFamily="18" charset="0"/>
+                <a:cs typeface="Times New Roman" pitchFamily="18" charset="0"/>
+              </a:rPr>
+              <a:t>		</a:t>
+            </a:r>
+          </a:p>
+          <a:p>
+            <a:pPr marL="0" indent="0" algn="just">
+              <a:lnSpc>
+                <a:spcPct val="80000"/>
+              </a:lnSpc>
+              <a:buSzPct val="100000"/>
+              <a:buNone/>
+              <a:defRPr/>
+            </a:pPr>
+            <a:r>
+              <a:rPr lang="es-ES" sz="2600" b="1" dirty="0">
+                <a:solidFill>
+                  <a:srgbClr val="00B050"/>
+                </a:solidFill>
+                <a:latin typeface="Times New Roman" pitchFamily="18" charset="0"/>
+                <a:cs typeface="Times New Roman" pitchFamily="18" charset="0"/>
+              </a:rPr>
+              <a:t> </a:t>
+            </a:r>
+            <a:r>
+              <a:rPr lang="es-ES" sz="2600" b="1" dirty="0" smtClean="0">
+                <a:solidFill>
+                  <a:srgbClr val="00B050"/>
+                </a:solidFill>
+                <a:latin typeface="Times New Roman" pitchFamily="18" charset="0"/>
+                <a:cs typeface="Times New Roman" pitchFamily="18" charset="0"/>
+              </a:rPr>
+              <a:t>Ejemplo</a:t>
+            </a:r>
+          </a:p>
+          <a:p>
+            <a:pPr marL="0" indent="0" algn="just">
+              <a:buSzPct val="100000"/>
+              <a:buNone/>
+              <a:defRPr/>
+            </a:pPr>
+            <a:r>
+              <a:rPr lang="es-ES" sz="2600" dirty="0" smtClean="0">
+                <a:latin typeface="Times New Roman" pitchFamily="18" charset="0"/>
+                <a:cs typeface="Times New Roman" pitchFamily="18" charset="0"/>
+              </a:rPr>
+              <a:t>Crear un usuario llamado prueba con password prueba que tenga privilegios de superusuario que pueda crear bases de datos y que puedan crear roles.</a:t>
+            </a:r>
+          </a:p>
+          <a:p>
+            <a:pPr marL="0" indent="0" algn="just">
+              <a:lnSpc>
+                <a:spcPct val="80000"/>
+              </a:lnSpc>
+              <a:buSzPct val="100000"/>
+              <a:buNone/>
+              <a:defRPr/>
+            </a:pPr>
+            <a:endParaRPr lang="es-ES" sz="2600" dirty="0">
+              <a:latin typeface="Times New Roman" pitchFamily="18" charset="0"/>
+              <a:cs typeface="Times New Roman" pitchFamily="18" charset="0"/>
+            </a:endParaRPr>
+          </a:p>
+          <a:p>
+            <a:pPr marL="0" indent="0" algn="just">
+              <a:lnSpc>
+                <a:spcPct val="80000"/>
+              </a:lnSpc>
+              <a:buSzPct val="100000"/>
+              <a:buNone/>
+              <a:defRPr/>
+            </a:pPr>
+            <a:r>
+              <a:rPr lang="es-ES" sz="2200" b="1" dirty="0" smtClean="0">
+                <a:solidFill>
+                  <a:srgbClr val="0070C0"/>
+                </a:solidFill>
+                <a:latin typeface="Times New Roman" pitchFamily="18" charset="0"/>
+                <a:cs typeface="Times New Roman" pitchFamily="18" charset="0"/>
+              </a:rPr>
+              <a:t>CREATE </a:t>
+            </a:r>
+            <a:r>
+              <a:rPr lang="es-ES" sz="2200" b="1" dirty="0">
+                <a:solidFill>
+                  <a:srgbClr val="0070C0"/>
+                </a:solidFill>
+                <a:latin typeface="Times New Roman" pitchFamily="18" charset="0"/>
+                <a:cs typeface="Times New Roman" pitchFamily="18" charset="0"/>
+              </a:rPr>
+              <a:t>USER PRUEBA WITH ENCRYPTED PASSWORD  ‘PRUEBA’ SUPERUSER CREATEDB CREATEROLE;</a:t>
+            </a:r>
+          </a:p>
+          <a:p>
+            <a:pPr>
+              <a:lnSpc>
+                <a:spcPct val="80000"/>
+              </a:lnSpc>
+              <a:buNone/>
+              <a:defRPr/>
+            </a:pPr>
+            <a:endParaRPr lang="es-ES" sz="2800" b="1" dirty="0" smtClean="0">
+              <a:solidFill>
+                <a:srgbClr val="0070C0"/>
+              </a:solidFill>
+              <a:latin typeface="Times New Roman" pitchFamily="18" charset="0"/>
+              <a:cs typeface="Times New Roman" pitchFamily="18" charset="0"/>
+            </a:endParaRPr>
+          </a:p>
+          <a:p>
+            <a:pPr eaLnBrk="1" hangingPunct="1">
+              <a:lnSpc>
+                <a:spcPct val="80000"/>
+              </a:lnSpc>
+              <a:buNone/>
+              <a:defRPr/>
+            </a:pPr>
+            <a:endParaRPr lang="es-ES" sz="2400" dirty="0" smtClean="0"/>
+          </a:p>
+          <a:p>
+            <a:pPr eaLnBrk="1" hangingPunct="1">
+              <a:lnSpc>
+                <a:spcPct val="80000"/>
+              </a:lnSpc>
+              <a:buFont typeface="Wingdings" pitchFamily="2" charset="2"/>
+              <a:buNone/>
+              <a:defRPr/>
+            </a:pPr>
+            <a:endParaRPr lang="es-ES" sz="2000" dirty="0" smtClean="0"/>
+          </a:p>
+        </p:txBody>
+      </p:sp>
+      <p:sp>
+        <p:nvSpPr>
+          <p:cNvPr id="6" name="13 Rectángulo"/>
+          <p:cNvSpPr/>
+          <p:nvPr/>
+        </p:nvSpPr>
+        <p:spPr>
+          <a:xfrm>
+            <a:off x="1331640" y="116632"/>
+            <a:ext cx="6828813" cy="1015663"/>
+          </a:xfrm>
+          <a:prstGeom prst="rect">
+            <a:avLst/>
+          </a:prstGeom>
+          <a:noFill/>
+        </p:spPr>
+        <p:txBody>
+          <a:bodyPr wrap="square" lIns="91440" tIns="45720" rIns="91440" bIns="45720">
+            <a:spAutoFit/>
+          </a:bodyPr>
+          <a:lstStyle/>
+          <a:p>
+            <a:pPr algn="ctr"/>
+            <a:r>
+              <a:rPr lang="es-ES" sz="3000" b="1" spc="50" dirty="0" smtClean="0">
+                <a:ln w="0"/>
+                <a:solidFill>
+                  <a:srgbClr val="C00000"/>
+                </a:solidFill>
+                <a:effectLst>
+                  <a:innerShdw blurRad="63500" dist="50800" dir="13500000">
+                    <a:srgbClr val="000000">
+                      <a:alpha val="50000"/>
+                    </a:srgbClr>
+                  </a:innerShdw>
+                </a:effectLst>
+                <a:latin typeface="Times New Roman" panose="02020603050405020304" pitchFamily="18" charset="0"/>
+                <a:cs typeface="Times New Roman" panose="02020603050405020304" pitchFamily="18" charset="0"/>
+              </a:rPr>
+              <a:t>POSTGRES:ADMINISTRACION DE USUARIOS</a:t>
+            </a:r>
+            <a:endParaRPr lang="es-BO" sz="3000" b="1" spc="50" dirty="0">
+              <a:ln w="0"/>
+              <a:solidFill>
+                <a:srgbClr val="C00000"/>
+              </a:solidFill>
+              <a:effectLst>
+                <a:innerShdw blurRad="63500" dist="50800" dir="13500000">
+                  <a:srgbClr val="000000">
+                    <a:alpha val="50000"/>
+                  </a:srgbClr>
+                </a:innerShdw>
+              </a:effectLst>
+              <a:latin typeface="Times New Roman" panose="02020603050405020304" pitchFamily="18" charset="0"/>
+              <a:cs typeface="Times New Roman" panose="02020603050405020304" pitchFamily="18" charset="0"/>
+            </a:endParaRPr>
+          </a:p>
+        </p:txBody>
+      </p:sp>
+    </p:spTree>
+    <p:extLst>
+      <p:ext uri="{BB962C8B-B14F-4D97-AF65-F5344CB8AC3E}">
+        <p14:creationId xmlns:p14="http://schemas.microsoft.com/office/powerpoint/2010/main" val="3862338656"/>
+      </p:ext>
+    </p:extLst>
+  </p:cSld>
+  <p:clrMapOvr>
+    <a:masterClrMapping/>
+  </p:clrMapOvr>
+  <p:timing>
+    <p:tnLst>
+      <p:par>
+        <p:cTn id="1" dur="indefinite" restart="never" nodeType="tmRoot"/>
+      </p:par>
+    </p:tnLst>
+  </p:timing>
+</p:sld>
+</file>
+
+<file path=ppt/slides/slide18.xml><?xml version="1.0" encoding="utf-8"?>
+<p:sld xmlns:a="http://schemas.openxmlformats.org/drawingml/2006/main" xmlns:r="http://schemas.openxmlformats.org/officeDocument/2006/relationships" xmlns:p="http://schemas.openxmlformats.org/presentationml/2006/main">
+  <p:cSld>
+    <p:spTree>
+      <p:nvGrpSpPr>
+        <p:cNvPr id="1" name=""/>
+        <p:cNvGrpSpPr/>
+        <p:nvPr/>
+      </p:nvGrpSpPr>
+      <p:grpSpPr>
+        <a:xfrm>
+          <a:off x="0" y="0"/>
+          <a:ext cx="0" cy="0"/>
+          <a:chOff x="0" y="0"/>
+          <a:chExt cx="0" cy="0"/>
+        </a:xfrm>
+      </p:grpSpPr>
+      <p:sp>
+        <p:nvSpPr>
+          <p:cNvPr id="4" name="Rectangle 2"/>
+          <p:cNvSpPr>
+            <a:spLocks noGrp="1" noChangeArrowheads="1"/>
+          </p:cNvSpPr>
+          <p:nvPr>
+            <p:ph idx="1"/>
+          </p:nvPr>
+        </p:nvSpPr>
+        <p:spPr>
+          <a:xfrm>
+            <a:off x="323528" y="1556792"/>
+            <a:ext cx="8427789" cy="4680520"/>
+          </a:xfrm>
+        </p:spPr>
+        <p:txBody>
+          <a:bodyPr>
+            <a:normAutofit/>
+          </a:bodyPr>
+          <a:lstStyle/>
+          <a:p>
+            <a:pPr algn="just">
+              <a:lnSpc>
+                <a:spcPct val="80000"/>
+              </a:lnSpc>
+              <a:buNone/>
+              <a:defRPr/>
+            </a:pPr>
+            <a:endParaRPr lang="es-ES" sz="2600" b="1" dirty="0">
+              <a:latin typeface="Times New Roman" pitchFamily="18" charset="0"/>
+              <a:cs typeface="Times New Roman" pitchFamily="18" charset="0"/>
+            </a:endParaRPr>
+          </a:p>
+          <a:p>
+            <a:pPr marL="0" indent="0" algn="just">
+              <a:lnSpc>
+                <a:spcPct val="80000"/>
+              </a:lnSpc>
+              <a:buSzPct val="100000"/>
+              <a:buNone/>
+              <a:defRPr/>
+            </a:pPr>
+            <a:r>
+              <a:rPr lang="es-ES" sz="2600" b="1" dirty="0">
+                <a:solidFill>
+                  <a:srgbClr val="00B050"/>
+                </a:solidFill>
+                <a:latin typeface="Times New Roman" pitchFamily="18" charset="0"/>
+                <a:cs typeface="Times New Roman" pitchFamily="18" charset="0"/>
+              </a:rPr>
+              <a:t> </a:t>
+            </a:r>
+            <a:r>
+              <a:rPr lang="es-ES" sz="2600" b="1" dirty="0" smtClean="0">
+                <a:solidFill>
+                  <a:srgbClr val="00B050"/>
+                </a:solidFill>
+                <a:latin typeface="Times New Roman" pitchFamily="18" charset="0"/>
+                <a:cs typeface="Times New Roman" pitchFamily="18" charset="0"/>
+              </a:rPr>
+              <a:t>Ejemplo</a:t>
+            </a:r>
+          </a:p>
+          <a:p>
+            <a:pPr marL="0" indent="0" algn="just">
+              <a:buSzPct val="100000"/>
+              <a:buNone/>
+              <a:defRPr/>
+            </a:pPr>
+            <a:r>
+              <a:rPr lang="es-ES" sz="2600" dirty="0" smtClean="0">
+                <a:latin typeface="Times New Roman" pitchFamily="18" charset="0"/>
+                <a:cs typeface="Times New Roman" pitchFamily="18" charset="0"/>
+              </a:rPr>
+              <a:t>Para poder quitar los privilegio de usuario se realiza lo siguiente</a:t>
+            </a:r>
+            <a:endParaRPr lang="es-ES" sz="2600" dirty="0">
+              <a:latin typeface="Times New Roman" pitchFamily="18" charset="0"/>
+              <a:cs typeface="Times New Roman" pitchFamily="18" charset="0"/>
+            </a:endParaRPr>
+          </a:p>
+          <a:p>
+            <a:pPr marL="0" indent="0" algn="just">
+              <a:lnSpc>
+                <a:spcPct val="80000"/>
+              </a:lnSpc>
+              <a:buSzPct val="100000"/>
+              <a:buNone/>
+              <a:defRPr/>
+            </a:pPr>
+            <a:r>
+              <a:rPr lang="es-ES" sz="2200" b="1" dirty="0" smtClean="0">
+                <a:solidFill>
+                  <a:srgbClr val="0070C0"/>
+                </a:solidFill>
+                <a:latin typeface="Times New Roman" pitchFamily="18" charset="0"/>
+                <a:cs typeface="Times New Roman" pitchFamily="18" charset="0"/>
+              </a:rPr>
+              <a:t>ALTER </a:t>
+            </a:r>
+            <a:r>
+              <a:rPr lang="es-ES" sz="2200" b="1" dirty="0">
+                <a:solidFill>
+                  <a:srgbClr val="0070C0"/>
+                </a:solidFill>
+                <a:latin typeface="Times New Roman" pitchFamily="18" charset="0"/>
+                <a:cs typeface="Times New Roman" pitchFamily="18" charset="0"/>
+              </a:rPr>
+              <a:t>USER </a:t>
+            </a:r>
+            <a:r>
+              <a:rPr lang="en-US" sz="2200" b="1" dirty="0" smtClean="0">
+                <a:solidFill>
+                  <a:srgbClr val="0070C0"/>
+                </a:solidFill>
+                <a:latin typeface="Times New Roman" pitchFamily="18" charset="0"/>
+                <a:cs typeface="Times New Roman" pitchFamily="18" charset="0"/>
+              </a:rPr>
+              <a:t>[USUARIO]</a:t>
+            </a:r>
+            <a:r>
+              <a:rPr lang="es-ES" sz="2200" b="1" dirty="0" smtClean="0">
+                <a:solidFill>
+                  <a:srgbClr val="0070C0"/>
+                </a:solidFill>
+                <a:latin typeface="Times New Roman" pitchFamily="18" charset="0"/>
+                <a:cs typeface="Times New Roman" pitchFamily="18" charset="0"/>
+              </a:rPr>
+              <a:t> WITH NOSUPERUSER NOCREATEDB NO  CREATEROLE</a:t>
+            </a:r>
+            <a:r>
+              <a:rPr lang="es-ES" sz="2200" b="1" dirty="0">
+                <a:solidFill>
+                  <a:srgbClr val="0070C0"/>
+                </a:solidFill>
+                <a:latin typeface="Times New Roman" pitchFamily="18" charset="0"/>
+                <a:cs typeface="Times New Roman" pitchFamily="18" charset="0"/>
+              </a:rPr>
+              <a:t>;</a:t>
+            </a:r>
+          </a:p>
+          <a:p>
+            <a:pPr>
+              <a:lnSpc>
+                <a:spcPct val="80000"/>
+              </a:lnSpc>
+              <a:buNone/>
+              <a:defRPr/>
+            </a:pPr>
+            <a:endParaRPr lang="es-ES" sz="2800" b="1" dirty="0" smtClean="0">
+              <a:solidFill>
+                <a:srgbClr val="0070C0"/>
+              </a:solidFill>
+              <a:latin typeface="Times New Roman" pitchFamily="18" charset="0"/>
+              <a:cs typeface="Times New Roman" pitchFamily="18" charset="0"/>
+            </a:endParaRPr>
+          </a:p>
+          <a:p>
+            <a:pPr eaLnBrk="1" hangingPunct="1">
+              <a:lnSpc>
+                <a:spcPct val="80000"/>
+              </a:lnSpc>
+              <a:buNone/>
+              <a:defRPr/>
+            </a:pPr>
+            <a:endParaRPr lang="es-ES" sz="2400" dirty="0" smtClean="0"/>
+          </a:p>
+          <a:p>
+            <a:pPr eaLnBrk="1" hangingPunct="1">
+              <a:lnSpc>
+                <a:spcPct val="80000"/>
+              </a:lnSpc>
+              <a:buFont typeface="Wingdings" pitchFamily="2" charset="2"/>
+              <a:buNone/>
+              <a:defRPr/>
+            </a:pPr>
+            <a:endParaRPr lang="es-ES" sz="2000" dirty="0" smtClean="0"/>
+          </a:p>
+        </p:txBody>
+      </p:sp>
+      <p:sp>
+        <p:nvSpPr>
+          <p:cNvPr id="6" name="13 Rectángulo"/>
+          <p:cNvSpPr/>
+          <p:nvPr/>
+        </p:nvSpPr>
+        <p:spPr>
+          <a:xfrm>
+            <a:off x="1331640" y="116632"/>
+            <a:ext cx="6828813" cy="1015663"/>
+          </a:xfrm>
+          <a:prstGeom prst="rect">
+            <a:avLst/>
+          </a:prstGeom>
+          <a:noFill/>
+        </p:spPr>
+        <p:txBody>
+          <a:bodyPr wrap="square" lIns="91440" tIns="45720" rIns="91440" bIns="45720">
+            <a:spAutoFit/>
+          </a:bodyPr>
+          <a:lstStyle/>
+          <a:p>
+            <a:pPr algn="ctr"/>
+            <a:r>
+              <a:rPr lang="es-ES" sz="3000" b="1" spc="50" dirty="0" smtClean="0">
+                <a:ln w="0"/>
+                <a:solidFill>
+                  <a:srgbClr val="C00000"/>
+                </a:solidFill>
+                <a:effectLst>
+                  <a:innerShdw blurRad="63500" dist="50800" dir="13500000">
+                    <a:srgbClr val="000000">
+                      <a:alpha val="50000"/>
+                    </a:srgbClr>
+                  </a:innerShdw>
+                </a:effectLst>
+                <a:latin typeface="Times New Roman" panose="02020603050405020304" pitchFamily="18" charset="0"/>
+                <a:cs typeface="Times New Roman" panose="02020603050405020304" pitchFamily="18" charset="0"/>
+              </a:rPr>
+              <a:t>POSTGRES:ADMINISTRACION DE USUARIOS</a:t>
+            </a:r>
+            <a:endParaRPr lang="es-BO" sz="3000" b="1" spc="50" dirty="0">
+              <a:ln w="0"/>
+              <a:solidFill>
+                <a:srgbClr val="C00000"/>
+              </a:solidFill>
+              <a:effectLst>
+                <a:innerShdw blurRad="63500" dist="50800" dir="13500000">
+                  <a:srgbClr val="000000">
+                    <a:alpha val="50000"/>
+                  </a:srgbClr>
+                </a:innerShdw>
+              </a:effectLst>
+              <a:latin typeface="Times New Roman" panose="02020603050405020304" pitchFamily="18" charset="0"/>
+              <a:cs typeface="Times New Roman" panose="02020603050405020304" pitchFamily="18" charset="0"/>
+            </a:endParaRPr>
+          </a:p>
+        </p:txBody>
+      </p:sp>
+      <p:pic>
+        <p:nvPicPr>
+          <p:cNvPr id="2" name="Imagen 1"/>
+          <p:cNvPicPr>
+            <a:picLocks noChangeAspect="1"/>
+          </p:cNvPicPr>
+          <p:nvPr/>
+        </p:nvPicPr>
+        <p:blipFill>
+          <a:blip r:embed="rId2"/>
+          <a:stretch>
+            <a:fillRect/>
+          </a:stretch>
+        </p:blipFill>
+        <p:spPr>
+          <a:xfrm>
+            <a:off x="1554061" y="4005064"/>
+            <a:ext cx="6383970" cy="1714286"/>
+          </a:xfrm>
+          <a:prstGeom prst="rect">
+            <a:avLst/>
+          </a:prstGeom>
+        </p:spPr>
+      </p:pic>
+    </p:spTree>
+    <p:extLst>
+      <p:ext uri="{BB962C8B-B14F-4D97-AF65-F5344CB8AC3E}">
+        <p14:creationId xmlns:p14="http://schemas.microsoft.com/office/powerpoint/2010/main" val="4077555308"/>
+      </p:ext>
+    </p:extLst>
+  </p:cSld>
+  <p:clrMapOvr>
+    <a:masterClrMapping/>
+  </p:clrMapOvr>
+  <p:timing>
+    <p:tnLst>
+      <p:par>
+        <p:cTn id="1" dur="indefinite" restart="never" nodeType="tmRoot"/>
+      </p:par>
+    </p:tnLst>
+  </p:timing>
+</p:sld>
+</file>
+
+<file path=ppt/slides/slide19.xml><?xml version="1.0" encoding="utf-8"?>
+<p:sld xmlns:a="http://schemas.openxmlformats.org/drawingml/2006/main" xmlns:r="http://schemas.openxmlformats.org/officeDocument/2006/relationships" xmlns:p="http://schemas.openxmlformats.org/presentationml/2006/main">
+  <p:cSld>
+    <p:spTree>
+      <p:nvGrpSpPr>
+        <p:cNvPr id="1" name=""/>
+        <p:cNvGrpSpPr/>
+        <p:nvPr/>
+      </p:nvGrpSpPr>
+      <p:grpSpPr>
+        <a:xfrm>
+          <a:off x="0" y="0"/>
+          <a:ext cx="0" cy="0"/>
+          <a:chOff x="0" y="0"/>
+          <a:chExt cx="0" cy="0"/>
+        </a:xfrm>
+      </p:grpSpPr>
+      <p:sp>
+        <p:nvSpPr>
+          <p:cNvPr id="3" name="2 Marcador de contenido"/>
+          <p:cNvSpPr>
+            <a:spLocks noGrp="1"/>
+          </p:cNvSpPr>
+          <p:nvPr>
+            <p:ph idx="1"/>
+          </p:nvPr>
+        </p:nvSpPr>
+        <p:spPr>
+          <a:xfrm>
+            <a:off x="323528" y="1628800"/>
+            <a:ext cx="8429684" cy="4752528"/>
+          </a:xfrm>
+        </p:spPr>
+        <p:txBody>
+          <a:bodyPr>
+            <a:normAutofit/>
+          </a:bodyPr>
+          <a:lstStyle/>
+          <a:p>
+            <a:pPr algn="just"/>
+            <a:r>
+              <a:rPr lang="es-BO" sz="2600" dirty="0" smtClean="0">
+                <a:latin typeface="Times New Roman" pitchFamily="18" charset="0"/>
+                <a:cs typeface="Times New Roman" pitchFamily="18" charset="0"/>
+              </a:rPr>
+              <a:t>Para poder eliminar un usuario del DBMS se utiliza el comando DROP de la siguiente manera:</a:t>
+            </a:r>
+          </a:p>
+          <a:p>
+            <a:pPr>
+              <a:buNone/>
+            </a:pPr>
+            <a:r>
+              <a:rPr lang="en-US" sz="2600" b="1" dirty="0" smtClean="0">
+                <a:latin typeface="Times New Roman" pitchFamily="18" charset="0"/>
+                <a:cs typeface="Times New Roman" pitchFamily="18" charset="0"/>
+              </a:rPr>
+              <a:t>	  </a:t>
+            </a:r>
+            <a:r>
+              <a:rPr lang="en-US" sz="2400" b="1" dirty="0" smtClean="0">
+                <a:solidFill>
+                  <a:srgbClr val="0070C0"/>
+                </a:solidFill>
+                <a:latin typeface="Times New Roman" pitchFamily="18" charset="0"/>
+                <a:cs typeface="Times New Roman" pitchFamily="18" charset="0"/>
+              </a:rPr>
+              <a:t>DROP USUARIO [NOMBRE DEL USUARIO];</a:t>
+            </a:r>
+          </a:p>
+          <a:p>
+            <a:pPr>
+              <a:buNone/>
+            </a:pPr>
+            <a:r>
+              <a:rPr lang="en-US" sz="2400" b="1" dirty="0">
+                <a:solidFill>
+                  <a:srgbClr val="0070C0"/>
+                </a:solidFill>
+                <a:latin typeface="Times New Roman" pitchFamily="18" charset="0"/>
+                <a:cs typeface="Times New Roman" pitchFamily="18" charset="0"/>
+              </a:rPr>
+              <a:t>	 </a:t>
+            </a:r>
+            <a:r>
+              <a:rPr lang="en-US" sz="2400" b="1" dirty="0" smtClean="0">
+                <a:solidFill>
+                  <a:srgbClr val="0070C0"/>
+                </a:solidFill>
+                <a:latin typeface="Times New Roman" pitchFamily="18" charset="0"/>
+                <a:cs typeface="Times New Roman" pitchFamily="18" charset="0"/>
+              </a:rPr>
+              <a:t> </a:t>
+            </a:r>
+            <a:r>
+              <a:rPr lang="en-US" sz="2400" b="1" dirty="0">
+                <a:solidFill>
+                  <a:srgbClr val="0070C0"/>
+                </a:solidFill>
+                <a:latin typeface="Times New Roman" pitchFamily="18" charset="0"/>
+                <a:cs typeface="Times New Roman" pitchFamily="18" charset="0"/>
+              </a:rPr>
+              <a:t>DROP </a:t>
+            </a:r>
+            <a:r>
+              <a:rPr lang="en-US" sz="2400" b="1" dirty="0" smtClean="0">
+                <a:solidFill>
+                  <a:srgbClr val="0070C0"/>
+                </a:solidFill>
+                <a:latin typeface="Times New Roman" pitchFamily="18" charset="0"/>
+                <a:cs typeface="Times New Roman" pitchFamily="18" charset="0"/>
+              </a:rPr>
+              <a:t>ROLE [NOMBRE </a:t>
+            </a:r>
+            <a:r>
+              <a:rPr lang="en-US" sz="2400" b="1" dirty="0">
+                <a:solidFill>
+                  <a:srgbClr val="0070C0"/>
+                </a:solidFill>
+                <a:latin typeface="Times New Roman" pitchFamily="18" charset="0"/>
+                <a:cs typeface="Times New Roman" pitchFamily="18" charset="0"/>
+              </a:rPr>
+              <a:t>DEL </a:t>
+            </a:r>
+            <a:r>
+              <a:rPr lang="en-US" sz="2400" b="1" dirty="0" smtClean="0">
+                <a:solidFill>
+                  <a:srgbClr val="0070C0"/>
+                </a:solidFill>
+                <a:latin typeface="Times New Roman" pitchFamily="18" charset="0"/>
+                <a:cs typeface="Times New Roman" pitchFamily="18" charset="0"/>
+              </a:rPr>
+              <a:t>ROLE];</a:t>
+            </a:r>
+          </a:p>
+          <a:p>
+            <a:r>
+              <a:rPr lang="es-BO" sz="2600" dirty="0" smtClean="0">
+                <a:latin typeface="Times New Roman" pitchFamily="18" charset="0"/>
+                <a:cs typeface="Times New Roman" pitchFamily="18" charset="0"/>
+              </a:rPr>
+              <a:t>Para poder modificar atributos de un usuario o un rol se utiliza la sentencia ALTER.</a:t>
+            </a:r>
+          </a:p>
+          <a:p>
+            <a:pPr marL="357188" indent="0">
+              <a:buNone/>
+            </a:pPr>
+            <a:r>
+              <a:rPr lang="es-BO" sz="2400" b="1" dirty="0" smtClean="0">
+                <a:solidFill>
+                  <a:srgbClr val="0070C0"/>
+                </a:solidFill>
+                <a:latin typeface="Times New Roman" pitchFamily="18" charset="0"/>
+                <a:cs typeface="Times New Roman" pitchFamily="18" charset="0"/>
+              </a:rPr>
+              <a:t>ALTER  USER prueba RENAME prueba1;</a:t>
+            </a:r>
+          </a:p>
+          <a:p>
+            <a:pPr marL="357188" indent="0">
+              <a:buNone/>
+            </a:pPr>
+            <a:r>
+              <a:rPr lang="es-BO" sz="2400" b="1" dirty="0" smtClean="0">
+                <a:solidFill>
+                  <a:srgbClr val="0070C0"/>
+                </a:solidFill>
+                <a:latin typeface="Times New Roman" pitchFamily="18" charset="0"/>
+                <a:cs typeface="Times New Roman" pitchFamily="18" charset="0"/>
+              </a:rPr>
+              <a:t>ALTER  ROLE "prueba" PASSWORD 'prueba';</a:t>
+            </a:r>
+          </a:p>
+          <a:p>
+            <a:pPr marL="357188" indent="0">
+              <a:buNone/>
+            </a:pPr>
+            <a:r>
+              <a:rPr lang="es-BO" sz="2400" b="1" dirty="0" smtClean="0">
+                <a:solidFill>
+                  <a:srgbClr val="0070C0"/>
+                </a:solidFill>
+                <a:latin typeface="Times New Roman" pitchFamily="18" charset="0"/>
+                <a:cs typeface="Times New Roman" pitchFamily="18" charset="0"/>
+              </a:rPr>
+              <a:t>ALTER  USER "prueba" PASSWORD 'prueba';</a:t>
+            </a:r>
+          </a:p>
+          <a:p>
+            <a:pPr>
+              <a:buNone/>
+            </a:pPr>
+            <a:endParaRPr lang="es-BO" dirty="0" smtClean="0"/>
+          </a:p>
+          <a:p>
+            <a:pPr>
+              <a:buNone/>
+            </a:pPr>
+            <a:endParaRPr lang="es-BO" dirty="0" smtClean="0"/>
+          </a:p>
+          <a:p>
+            <a:pPr>
+              <a:buNone/>
+            </a:pPr>
+            <a:endParaRPr lang="es-BO" dirty="0" smtClean="0"/>
+          </a:p>
+          <a:p>
+            <a:pPr>
+              <a:buNone/>
+            </a:pPr>
+            <a:endParaRPr lang="es-BO" dirty="0"/>
+          </a:p>
+        </p:txBody>
+      </p:sp>
+      <p:sp>
+        <p:nvSpPr>
+          <p:cNvPr id="6" name="13 Rectángulo"/>
+          <p:cNvSpPr/>
+          <p:nvPr/>
+        </p:nvSpPr>
+        <p:spPr>
+          <a:xfrm>
+            <a:off x="1331640" y="116632"/>
+            <a:ext cx="6828813" cy="1015663"/>
+          </a:xfrm>
+          <a:prstGeom prst="rect">
+            <a:avLst/>
+          </a:prstGeom>
+          <a:noFill/>
+        </p:spPr>
+        <p:txBody>
+          <a:bodyPr wrap="square" lIns="91440" tIns="45720" rIns="91440" bIns="45720">
+            <a:spAutoFit/>
+          </a:bodyPr>
+          <a:lstStyle/>
+          <a:p>
+            <a:pPr algn="ctr"/>
+            <a:r>
+              <a:rPr lang="es-ES" sz="3000" b="1" spc="50" dirty="0" smtClean="0">
+                <a:ln w="0"/>
+                <a:solidFill>
+                  <a:srgbClr val="C00000"/>
+                </a:solidFill>
+                <a:effectLst>
+                  <a:innerShdw blurRad="63500" dist="50800" dir="13500000">
+                    <a:srgbClr val="000000">
+                      <a:alpha val="50000"/>
+                    </a:srgbClr>
+                  </a:innerShdw>
+                </a:effectLst>
+                <a:latin typeface="Times New Roman" panose="02020603050405020304" pitchFamily="18" charset="0"/>
+                <a:cs typeface="Times New Roman" panose="02020603050405020304" pitchFamily="18" charset="0"/>
+              </a:rPr>
+              <a:t>POSTGRES:ADMINISTRACION DE USUARIOS</a:t>
+            </a:r>
+            <a:endParaRPr lang="es-BO" sz="3000" b="1" spc="50" dirty="0">
+              <a:ln w="0"/>
+              <a:solidFill>
+                <a:srgbClr val="C00000"/>
+              </a:solidFill>
+              <a:effectLst>
+                <a:innerShdw blurRad="63500" dist="50800" dir="13500000">
+                  <a:srgbClr val="000000">
+                    <a:alpha val="50000"/>
+                  </a:srgbClr>
+                </a:innerShdw>
+              </a:effectLst>
+              <a:latin typeface="Times New Roman" panose="02020603050405020304" pitchFamily="18" charset="0"/>
+              <a:cs typeface="Times New Roman" panose="02020603050405020304" pitchFamily="18" charset="0"/>
+            </a:endParaRPr>
+          </a:p>
+        </p:txBody>
+      </p:sp>
+    </p:spTree>
+    <p:extLst>
+      <p:ext uri="{BB962C8B-B14F-4D97-AF65-F5344CB8AC3E}">
+        <p14:creationId xmlns:p14="http://schemas.microsoft.com/office/powerpoint/2010/main" val="2803567970"/>
       </p:ext>
     </p:extLst>
   </p:cSld>
@@ -10078,6 +10997,2006 @@
     <p:extLst>
       <p:ext uri="{BB962C8B-B14F-4D97-AF65-F5344CB8AC3E}">
         <p14:creationId xmlns:p14="http://schemas.microsoft.com/office/powerpoint/2010/main" val="2766688942"/>
+      </p:ext>
+    </p:extLst>
+  </p:cSld>
+  <p:clrMapOvr>
+    <a:masterClrMapping/>
+  </p:clrMapOvr>
+  <p:timing>
+    <p:tnLst>
+      <p:par>
+        <p:cTn id="1" dur="indefinite" restart="never" nodeType="tmRoot"/>
+      </p:par>
+    </p:tnLst>
+  </p:timing>
+</p:sld>
+</file>
+
+<file path=ppt/slides/slide20.xml><?xml version="1.0" encoding="utf-8"?>
+<p:sld xmlns:a="http://schemas.openxmlformats.org/drawingml/2006/main" xmlns:r="http://schemas.openxmlformats.org/officeDocument/2006/relationships" xmlns:p="http://schemas.openxmlformats.org/presentationml/2006/main">
+  <p:cSld>
+    <p:spTree>
+      <p:nvGrpSpPr>
+        <p:cNvPr id="1" name=""/>
+        <p:cNvGrpSpPr/>
+        <p:nvPr/>
+      </p:nvGrpSpPr>
+      <p:grpSpPr>
+        <a:xfrm>
+          <a:off x="0" y="0"/>
+          <a:ext cx="0" cy="0"/>
+          <a:chOff x="0" y="0"/>
+          <a:chExt cx="0" cy="0"/>
+        </a:xfrm>
+      </p:grpSpPr>
+      <p:sp>
+        <p:nvSpPr>
+          <p:cNvPr id="3" name="2 Marcador de contenido"/>
+          <p:cNvSpPr>
+            <a:spLocks noGrp="1"/>
+          </p:cNvSpPr>
+          <p:nvPr>
+            <p:ph idx="1"/>
+          </p:nvPr>
+        </p:nvSpPr>
+        <p:spPr>
+          <a:xfrm>
+            <a:off x="251520" y="1724816"/>
+            <a:ext cx="8640960" cy="4512496"/>
+          </a:xfrm>
+        </p:spPr>
+        <p:txBody>
+          <a:bodyPr>
+            <a:normAutofit fontScale="92500"/>
+          </a:bodyPr>
+          <a:lstStyle/>
+          <a:p>
+            <a:pPr algn="just"/>
+            <a:r>
+              <a:rPr lang="es-BO" sz="2600" dirty="0" smtClean="0">
+                <a:latin typeface="Times New Roman" pitchFamily="18" charset="0"/>
+                <a:cs typeface="Times New Roman" pitchFamily="18" charset="0"/>
+              </a:rPr>
+              <a:t>Para poder crear un objeto  ya sea base de datos, tablas se utiliza el comando crear  de la siguiente manera:</a:t>
+            </a:r>
+          </a:p>
+          <a:p>
+            <a:pPr marL="174625" indent="0" algn="just">
+              <a:buNone/>
+            </a:pPr>
+            <a:r>
+              <a:rPr lang="en-US" sz="2600" b="1" dirty="0" smtClean="0">
+                <a:solidFill>
+                  <a:srgbClr val="0070C0"/>
+                </a:solidFill>
+                <a:latin typeface="Times New Roman" pitchFamily="18" charset="0"/>
+                <a:cs typeface="Times New Roman" pitchFamily="18" charset="0"/>
+              </a:rPr>
+              <a:t>CREATE </a:t>
+            </a:r>
+            <a:r>
+              <a:rPr lang="en-US" sz="2600" b="1" dirty="0">
+                <a:solidFill>
+                  <a:srgbClr val="0070C0"/>
+                </a:solidFill>
+                <a:latin typeface="Times New Roman" pitchFamily="18" charset="0"/>
+                <a:cs typeface="Times New Roman" pitchFamily="18" charset="0"/>
+              </a:rPr>
+              <a:t>DATABASE [NOMBRE DE LA BASE DE DATOS</a:t>
+            </a:r>
+            <a:r>
+              <a:rPr lang="en-US" sz="2600" b="1" dirty="0" smtClean="0">
+                <a:solidFill>
+                  <a:srgbClr val="0070C0"/>
+                </a:solidFill>
+                <a:latin typeface="Times New Roman" pitchFamily="18" charset="0"/>
+                <a:cs typeface="Times New Roman" pitchFamily="18" charset="0"/>
+              </a:rPr>
+              <a:t>];</a:t>
+            </a:r>
+            <a:endParaRPr lang="es-BO" sz="2600" dirty="0" smtClean="0">
+              <a:latin typeface="Times New Roman" pitchFamily="18" charset="0"/>
+              <a:cs typeface="Times New Roman" pitchFamily="18" charset="0"/>
+            </a:endParaRPr>
+          </a:p>
+          <a:p>
+            <a:pPr algn="just"/>
+            <a:r>
+              <a:rPr lang="en-US" sz="2600" dirty="0" smtClean="0">
+                <a:latin typeface="Times New Roman" pitchFamily="18" charset="0"/>
+                <a:cs typeface="Times New Roman" pitchFamily="18" charset="0"/>
+              </a:rPr>
+              <a:t>Para crear una base de datos con due</a:t>
+            </a:r>
+            <a:r>
+              <a:rPr lang="es-BO" sz="2600" dirty="0" smtClean="0">
+                <a:latin typeface="Times New Roman" pitchFamily="18" charset="0"/>
+                <a:cs typeface="Times New Roman" pitchFamily="18" charset="0"/>
+              </a:rPr>
+              <a:t>ño se crea de la siguiente manera</a:t>
+            </a:r>
+            <a:r>
+              <a:rPr lang="en-US" sz="2600" dirty="0" smtClean="0">
+                <a:latin typeface="Times New Roman" pitchFamily="18" charset="0"/>
+                <a:cs typeface="Times New Roman" pitchFamily="18" charset="0"/>
+              </a:rPr>
+              <a:t>.</a:t>
+            </a:r>
+          </a:p>
+          <a:p>
+            <a:pPr marL="0" indent="0" algn="just">
+              <a:buNone/>
+            </a:pPr>
+            <a:r>
+              <a:rPr lang="en-US" sz="2600" b="1" dirty="0" smtClean="0">
+                <a:solidFill>
+                  <a:srgbClr val="0070C0"/>
+                </a:solidFill>
+                <a:latin typeface="Times New Roman" pitchFamily="18" charset="0"/>
+                <a:cs typeface="Times New Roman" pitchFamily="18" charset="0"/>
+              </a:rPr>
+              <a:t> CREATE </a:t>
+            </a:r>
+            <a:r>
+              <a:rPr lang="en-US" sz="2600" b="1" dirty="0">
+                <a:solidFill>
+                  <a:srgbClr val="0070C0"/>
+                </a:solidFill>
+                <a:latin typeface="Times New Roman" pitchFamily="18" charset="0"/>
+                <a:cs typeface="Times New Roman" pitchFamily="18" charset="0"/>
+              </a:rPr>
+              <a:t>DATABASE [NOMBRE DE LA BASE DE </a:t>
+            </a:r>
+            <a:r>
+              <a:rPr lang="en-US" sz="2600" b="1" dirty="0" smtClean="0">
+                <a:solidFill>
+                  <a:srgbClr val="0070C0"/>
+                </a:solidFill>
+                <a:latin typeface="Times New Roman" pitchFamily="18" charset="0"/>
+                <a:cs typeface="Times New Roman" pitchFamily="18" charset="0"/>
+              </a:rPr>
+              <a:t>    DATOS</a:t>
+            </a:r>
+            <a:r>
+              <a:rPr lang="en-US" sz="2600" b="1" dirty="0">
+                <a:solidFill>
+                  <a:srgbClr val="0070C0"/>
+                </a:solidFill>
+                <a:latin typeface="Times New Roman" pitchFamily="18" charset="0"/>
+                <a:cs typeface="Times New Roman" pitchFamily="18" charset="0"/>
+              </a:rPr>
+              <a:t>] </a:t>
+            </a:r>
+            <a:r>
+              <a:rPr lang="en-US" sz="2600" b="1" dirty="0" smtClean="0">
+                <a:solidFill>
+                  <a:srgbClr val="0070C0"/>
+                </a:solidFill>
+                <a:latin typeface="Times New Roman" pitchFamily="18" charset="0"/>
+                <a:cs typeface="Times New Roman" pitchFamily="18" charset="0"/>
+              </a:rPr>
+              <a:t> OWNER </a:t>
+            </a:r>
+            <a:r>
+              <a:rPr lang="en-US" sz="2600" b="1" dirty="0">
+                <a:solidFill>
+                  <a:srgbClr val="0070C0"/>
+                </a:solidFill>
+                <a:latin typeface="Times New Roman" pitchFamily="18" charset="0"/>
+                <a:cs typeface="Times New Roman" pitchFamily="18" charset="0"/>
+              </a:rPr>
+              <a:t>[NOMBRE_USUARIO</a:t>
+            </a:r>
+            <a:r>
+              <a:rPr lang="en-US" sz="2600" b="1" dirty="0" smtClean="0">
+                <a:solidFill>
+                  <a:srgbClr val="0070C0"/>
+                </a:solidFill>
+                <a:latin typeface="Times New Roman" pitchFamily="18" charset="0"/>
+                <a:cs typeface="Times New Roman" pitchFamily="18" charset="0"/>
+              </a:rPr>
+              <a:t>];</a:t>
+            </a:r>
+            <a:endParaRPr lang="en-US" sz="2600" dirty="0" smtClean="0">
+              <a:latin typeface="Times New Roman" pitchFamily="18" charset="0"/>
+              <a:cs typeface="Times New Roman" pitchFamily="18" charset="0"/>
+            </a:endParaRPr>
+          </a:p>
+          <a:p>
+            <a:pPr algn="just"/>
+            <a:r>
+              <a:rPr lang="en-US" sz="2400" dirty="0" smtClean="0">
+                <a:latin typeface="Times New Roman" pitchFamily="18" charset="0"/>
+                <a:cs typeface="Times New Roman" pitchFamily="18" charset="0"/>
+              </a:rPr>
+              <a:t>La sentencia para poder crear una table se lo realiza de la siguiente manera.</a:t>
+            </a:r>
+          </a:p>
+          <a:p>
+            <a:pPr>
+              <a:buNone/>
+            </a:pPr>
+            <a:r>
+              <a:rPr lang="en-US" sz="2400" b="1" dirty="0" smtClean="0">
+                <a:solidFill>
+                  <a:srgbClr val="0070C0"/>
+                </a:solidFill>
+                <a:latin typeface="Times New Roman" pitchFamily="18" charset="0"/>
+                <a:cs typeface="Times New Roman" pitchFamily="18" charset="0"/>
+              </a:rPr>
+              <a:t>  CREATE TABLE [NOMBRE TABLA](ATRIB1, ATRIB2…);</a:t>
+            </a:r>
+          </a:p>
+          <a:p>
+            <a:pPr>
+              <a:buNone/>
+            </a:pPr>
+            <a:r>
+              <a:rPr lang="en-US" sz="2600" b="1" dirty="0">
+                <a:latin typeface="Times New Roman" pitchFamily="18" charset="0"/>
+                <a:cs typeface="Times New Roman" pitchFamily="18" charset="0"/>
+              </a:rPr>
+              <a:t> </a:t>
+            </a:r>
+            <a:r>
+              <a:rPr lang="en-US" sz="2600" b="1" dirty="0" smtClean="0">
+                <a:latin typeface="Times New Roman" pitchFamily="18" charset="0"/>
+                <a:cs typeface="Times New Roman" pitchFamily="18" charset="0"/>
+              </a:rPr>
+              <a:t>  </a:t>
+            </a:r>
+          </a:p>
+          <a:p>
+            <a:pPr>
+              <a:buNone/>
+            </a:pPr>
+            <a:endParaRPr lang="es-BO" sz="2600" dirty="0" smtClean="0"/>
+          </a:p>
+          <a:p>
+            <a:pPr>
+              <a:buNone/>
+            </a:pPr>
+            <a:endParaRPr lang="es-BO" dirty="0" smtClean="0"/>
+          </a:p>
+          <a:p>
+            <a:pPr>
+              <a:buNone/>
+            </a:pPr>
+            <a:endParaRPr lang="es-BO" dirty="0" smtClean="0"/>
+          </a:p>
+          <a:p>
+            <a:pPr>
+              <a:buNone/>
+            </a:pPr>
+            <a:endParaRPr lang="es-BO" dirty="0"/>
+          </a:p>
+        </p:txBody>
+      </p:sp>
+      <p:sp>
+        <p:nvSpPr>
+          <p:cNvPr id="6" name="13 Rectángulo"/>
+          <p:cNvSpPr/>
+          <p:nvPr/>
+        </p:nvSpPr>
+        <p:spPr>
+          <a:xfrm>
+            <a:off x="1331640" y="116632"/>
+            <a:ext cx="6828813" cy="1015663"/>
+          </a:xfrm>
+          <a:prstGeom prst="rect">
+            <a:avLst/>
+          </a:prstGeom>
+          <a:noFill/>
+        </p:spPr>
+        <p:txBody>
+          <a:bodyPr wrap="square" lIns="91440" tIns="45720" rIns="91440" bIns="45720">
+            <a:spAutoFit/>
+          </a:bodyPr>
+          <a:lstStyle/>
+          <a:p>
+            <a:pPr algn="ctr"/>
+            <a:r>
+              <a:rPr lang="es-ES" sz="3000" b="1" spc="50" dirty="0" smtClean="0">
+                <a:ln w="0"/>
+                <a:solidFill>
+                  <a:srgbClr val="C00000"/>
+                </a:solidFill>
+                <a:effectLst>
+                  <a:innerShdw blurRad="63500" dist="50800" dir="13500000">
+                    <a:srgbClr val="000000">
+                      <a:alpha val="50000"/>
+                    </a:srgbClr>
+                  </a:innerShdw>
+                </a:effectLst>
+                <a:latin typeface="Times New Roman" panose="02020603050405020304" pitchFamily="18" charset="0"/>
+                <a:cs typeface="Times New Roman" panose="02020603050405020304" pitchFamily="18" charset="0"/>
+              </a:rPr>
+              <a:t>POSTGRES:ADMINISTRACION DE BASE DE DATOS</a:t>
+            </a:r>
+            <a:endParaRPr lang="es-BO" sz="3000" b="1" spc="50" dirty="0">
+              <a:ln w="0"/>
+              <a:solidFill>
+                <a:srgbClr val="C00000"/>
+              </a:solidFill>
+              <a:effectLst>
+                <a:innerShdw blurRad="63500" dist="50800" dir="13500000">
+                  <a:srgbClr val="000000">
+                    <a:alpha val="50000"/>
+                  </a:srgbClr>
+                </a:innerShdw>
+              </a:effectLst>
+              <a:latin typeface="Times New Roman" panose="02020603050405020304" pitchFamily="18" charset="0"/>
+              <a:cs typeface="Times New Roman" panose="02020603050405020304" pitchFamily="18" charset="0"/>
+            </a:endParaRPr>
+          </a:p>
+        </p:txBody>
+      </p:sp>
+    </p:spTree>
+    <p:extLst>
+      <p:ext uri="{BB962C8B-B14F-4D97-AF65-F5344CB8AC3E}">
+        <p14:creationId xmlns:p14="http://schemas.microsoft.com/office/powerpoint/2010/main" val="2198442780"/>
+      </p:ext>
+    </p:extLst>
+  </p:cSld>
+  <p:clrMapOvr>
+    <a:masterClrMapping/>
+  </p:clrMapOvr>
+  <p:timing>
+    <p:tnLst>
+      <p:par>
+        <p:cTn id="1" dur="indefinite" restart="never" nodeType="tmRoot"/>
+      </p:par>
+    </p:tnLst>
+  </p:timing>
+</p:sld>
+</file>
+
+<file path=ppt/slides/slide21.xml><?xml version="1.0" encoding="utf-8"?>
+<p:sld xmlns:a="http://schemas.openxmlformats.org/drawingml/2006/main" xmlns:r="http://schemas.openxmlformats.org/officeDocument/2006/relationships" xmlns:p="http://schemas.openxmlformats.org/presentationml/2006/main">
+  <p:cSld>
+    <p:spTree>
+      <p:nvGrpSpPr>
+        <p:cNvPr id="1" name=""/>
+        <p:cNvGrpSpPr/>
+        <p:nvPr/>
+      </p:nvGrpSpPr>
+      <p:grpSpPr>
+        <a:xfrm>
+          <a:off x="0" y="0"/>
+          <a:ext cx="0" cy="0"/>
+          <a:chOff x="0" y="0"/>
+          <a:chExt cx="0" cy="0"/>
+        </a:xfrm>
+      </p:grpSpPr>
+      <p:sp>
+        <p:nvSpPr>
+          <p:cNvPr id="3" name="2 Marcador de contenido"/>
+          <p:cNvSpPr>
+            <a:spLocks noGrp="1"/>
+          </p:cNvSpPr>
+          <p:nvPr>
+            <p:ph idx="1"/>
+          </p:nvPr>
+        </p:nvSpPr>
+        <p:spPr>
+          <a:xfrm>
+            <a:off x="251520" y="1588296"/>
+            <a:ext cx="8640960" cy="4512496"/>
+          </a:xfrm>
+        </p:spPr>
+        <p:txBody>
+          <a:bodyPr>
+            <a:normAutofit/>
+          </a:bodyPr>
+          <a:lstStyle/>
+          <a:p>
+            <a:pPr algn="just"/>
+            <a:r>
+              <a:rPr lang="en-US" sz="2600" dirty="0" smtClean="0">
+                <a:latin typeface="Times New Roman" pitchFamily="18" charset="0"/>
+                <a:cs typeface="Times New Roman" pitchFamily="18" charset="0"/>
+              </a:rPr>
+              <a:t>Para </a:t>
+            </a:r>
+            <a:r>
+              <a:rPr lang="en-US" sz="2600" dirty="0" smtClean="0">
+                <a:latin typeface="Times New Roman" pitchFamily="18" charset="0"/>
+                <a:cs typeface="Times New Roman" pitchFamily="18" charset="0"/>
+              </a:rPr>
+              <a:t>crear una base de datos con due</a:t>
+            </a:r>
+            <a:r>
+              <a:rPr lang="es-BO" sz="2600" dirty="0" smtClean="0">
+                <a:latin typeface="Times New Roman" pitchFamily="18" charset="0"/>
+                <a:cs typeface="Times New Roman" pitchFamily="18" charset="0"/>
+              </a:rPr>
+              <a:t>ño se crea de la siguiente manera</a:t>
+            </a:r>
+            <a:r>
+              <a:rPr lang="en-US" sz="2600" dirty="0" smtClean="0">
+                <a:latin typeface="Times New Roman" pitchFamily="18" charset="0"/>
+                <a:cs typeface="Times New Roman" pitchFamily="18" charset="0"/>
+              </a:rPr>
+              <a:t>.</a:t>
+            </a:r>
+          </a:p>
+          <a:p>
+            <a:pPr algn="just"/>
+            <a:endParaRPr lang="en-US" sz="2600" dirty="0">
+              <a:latin typeface="Times New Roman" pitchFamily="18" charset="0"/>
+              <a:cs typeface="Times New Roman" pitchFamily="18" charset="0"/>
+            </a:endParaRPr>
+          </a:p>
+          <a:p>
+            <a:pPr algn="just"/>
+            <a:endParaRPr lang="en-US" sz="2600" dirty="0" smtClean="0">
+              <a:latin typeface="Times New Roman" pitchFamily="18" charset="0"/>
+              <a:cs typeface="Times New Roman" pitchFamily="18" charset="0"/>
+            </a:endParaRPr>
+          </a:p>
+          <a:p>
+            <a:pPr algn="just"/>
+            <a:endParaRPr lang="en-US" sz="2600" dirty="0">
+              <a:latin typeface="Times New Roman" pitchFamily="18" charset="0"/>
+              <a:cs typeface="Times New Roman" pitchFamily="18" charset="0"/>
+            </a:endParaRPr>
+          </a:p>
+          <a:p>
+            <a:pPr algn="just"/>
+            <a:r>
+              <a:rPr lang="en-US" sz="2600" dirty="0" smtClean="0">
+                <a:latin typeface="Times New Roman" pitchFamily="18" charset="0"/>
+                <a:cs typeface="Times New Roman" pitchFamily="18" charset="0"/>
+              </a:rPr>
+              <a:t>Comando para asignar permisos es GRANT</a:t>
+            </a:r>
+            <a:endParaRPr lang="en-US" sz="2600" dirty="0">
+              <a:latin typeface="Times New Roman" pitchFamily="18" charset="0"/>
+              <a:cs typeface="Times New Roman" pitchFamily="18" charset="0"/>
+            </a:endParaRPr>
+          </a:p>
+          <a:p>
+            <a:pPr marL="0" indent="0" algn="just">
+              <a:buNone/>
+            </a:pPr>
+            <a:endParaRPr lang="en-US" sz="2600" dirty="0" smtClean="0">
+              <a:latin typeface="Times New Roman" pitchFamily="18" charset="0"/>
+              <a:cs typeface="Times New Roman" pitchFamily="18" charset="0"/>
+            </a:endParaRPr>
+          </a:p>
+          <a:p>
+            <a:pPr>
+              <a:buNone/>
+            </a:pPr>
+            <a:r>
+              <a:rPr lang="en-US" sz="2600" b="1" dirty="0" smtClean="0">
+                <a:latin typeface="Times New Roman" pitchFamily="18" charset="0"/>
+                <a:cs typeface="Times New Roman" pitchFamily="18" charset="0"/>
+              </a:rPr>
+              <a:t>   </a:t>
+            </a:r>
+            <a:endParaRPr lang="en-US" sz="2600" b="1" dirty="0" smtClean="0">
+              <a:latin typeface="Times New Roman" pitchFamily="18" charset="0"/>
+              <a:cs typeface="Times New Roman" pitchFamily="18" charset="0"/>
+            </a:endParaRPr>
+          </a:p>
+          <a:p>
+            <a:pPr>
+              <a:buNone/>
+            </a:pPr>
+            <a:endParaRPr lang="es-BO" sz="2600" dirty="0" smtClean="0"/>
+          </a:p>
+          <a:p>
+            <a:pPr>
+              <a:buNone/>
+            </a:pPr>
+            <a:endParaRPr lang="es-BO" dirty="0" smtClean="0"/>
+          </a:p>
+          <a:p>
+            <a:pPr>
+              <a:buNone/>
+            </a:pPr>
+            <a:endParaRPr lang="es-BO" dirty="0" smtClean="0"/>
+          </a:p>
+          <a:p>
+            <a:pPr>
+              <a:buNone/>
+            </a:pPr>
+            <a:endParaRPr lang="es-BO" dirty="0"/>
+          </a:p>
+        </p:txBody>
+      </p:sp>
+      <p:sp>
+        <p:nvSpPr>
+          <p:cNvPr id="6" name="13 Rectángulo"/>
+          <p:cNvSpPr/>
+          <p:nvPr/>
+        </p:nvSpPr>
+        <p:spPr>
+          <a:xfrm>
+            <a:off x="1331640" y="116632"/>
+            <a:ext cx="6828813" cy="1015663"/>
+          </a:xfrm>
+          <a:prstGeom prst="rect">
+            <a:avLst/>
+          </a:prstGeom>
+          <a:noFill/>
+        </p:spPr>
+        <p:txBody>
+          <a:bodyPr wrap="square" lIns="91440" tIns="45720" rIns="91440" bIns="45720">
+            <a:spAutoFit/>
+          </a:bodyPr>
+          <a:lstStyle/>
+          <a:p>
+            <a:pPr algn="ctr"/>
+            <a:r>
+              <a:rPr lang="es-ES" sz="3000" b="1" spc="50" dirty="0" smtClean="0">
+                <a:ln w="0"/>
+                <a:solidFill>
+                  <a:srgbClr val="C00000"/>
+                </a:solidFill>
+                <a:effectLst>
+                  <a:innerShdw blurRad="63500" dist="50800" dir="13500000">
+                    <a:srgbClr val="000000">
+                      <a:alpha val="50000"/>
+                    </a:srgbClr>
+                  </a:innerShdw>
+                </a:effectLst>
+                <a:latin typeface="Times New Roman" panose="02020603050405020304" pitchFamily="18" charset="0"/>
+                <a:cs typeface="Times New Roman" panose="02020603050405020304" pitchFamily="18" charset="0"/>
+              </a:rPr>
+              <a:t>POSTGRES:ADMINISTRACION DE BASE DE DATOS</a:t>
+            </a:r>
+            <a:endParaRPr lang="es-BO" sz="3000" b="1" spc="50" dirty="0">
+              <a:ln w="0"/>
+              <a:solidFill>
+                <a:srgbClr val="C00000"/>
+              </a:solidFill>
+              <a:effectLst>
+                <a:innerShdw blurRad="63500" dist="50800" dir="13500000">
+                  <a:srgbClr val="000000">
+                    <a:alpha val="50000"/>
+                  </a:srgbClr>
+                </a:innerShdw>
+              </a:effectLst>
+              <a:latin typeface="Times New Roman" panose="02020603050405020304" pitchFamily="18" charset="0"/>
+              <a:cs typeface="Times New Roman" panose="02020603050405020304" pitchFamily="18" charset="0"/>
+            </a:endParaRPr>
+          </a:p>
+        </p:txBody>
+      </p:sp>
+      <p:pic>
+        <p:nvPicPr>
+          <p:cNvPr id="2" name="Imagen 1"/>
+          <p:cNvPicPr>
+            <a:picLocks noChangeAspect="1"/>
+          </p:cNvPicPr>
+          <p:nvPr/>
+        </p:nvPicPr>
+        <p:blipFill>
+          <a:blip r:embed="rId2"/>
+          <a:stretch>
+            <a:fillRect/>
+          </a:stretch>
+        </p:blipFill>
+        <p:spPr>
+          <a:xfrm>
+            <a:off x="1979712" y="2195924"/>
+            <a:ext cx="5828810" cy="1648620"/>
+          </a:xfrm>
+          <a:prstGeom prst="rect">
+            <a:avLst/>
+          </a:prstGeom>
+        </p:spPr>
+      </p:pic>
+      <p:pic>
+        <p:nvPicPr>
+          <p:cNvPr id="4" name="Imagen 3"/>
+          <p:cNvPicPr>
+            <a:picLocks noChangeAspect="1"/>
+          </p:cNvPicPr>
+          <p:nvPr/>
+        </p:nvPicPr>
+        <p:blipFill>
+          <a:blip r:embed="rId3"/>
+          <a:stretch>
+            <a:fillRect/>
+          </a:stretch>
+        </p:blipFill>
+        <p:spPr>
+          <a:xfrm>
+            <a:off x="2483768" y="4452172"/>
+            <a:ext cx="5036722" cy="1819815"/>
+          </a:xfrm>
+          <a:prstGeom prst="rect">
+            <a:avLst/>
+          </a:prstGeom>
+        </p:spPr>
+      </p:pic>
+    </p:spTree>
+    <p:extLst>
+      <p:ext uri="{BB962C8B-B14F-4D97-AF65-F5344CB8AC3E}">
+        <p14:creationId xmlns:p14="http://schemas.microsoft.com/office/powerpoint/2010/main" val="862412156"/>
+      </p:ext>
+    </p:extLst>
+  </p:cSld>
+  <p:clrMapOvr>
+    <a:masterClrMapping/>
+  </p:clrMapOvr>
+  <p:timing>
+    <p:tnLst>
+      <p:par>
+        <p:cTn id="1" dur="indefinite" restart="never" nodeType="tmRoot"/>
+      </p:par>
+    </p:tnLst>
+  </p:timing>
+</p:sld>
+</file>
+
+<file path=ppt/slides/slide22.xml><?xml version="1.0" encoding="utf-8"?>
+<p:sld xmlns:a="http://schemas.openxmlformats.org/drawingml/2006/main" xmlns:r="http://schemas.openxmlformats.org/officeDocument/2006/relationships" xmlns:p="http://schemas.openxmlformats.org/presentationml/2006/main">
+  <p:cSld>
+    <p:spTree>
+      <p:nvGrpSpPr>
+        <p:cNvPr id="1" name=""/>
+        <p:cNvGrpSpPr/>
+        <p:nvPr/>
+      </p:nvGrpSpPr>
+      <p:grpSpPr>
+        <a:xfrm>
+          <a:off x="0" y="0"/>
+          <a:ext cx="0" cy="0"/>
+          <a:chOff x="0" y="0"/>
+          <a:chExt cx="0" cy="0"/>
+        </a:xfrm>
+      </p:grpSpPr>
+      <p:sp>
+        <p:nvSpPr>
+          <p:cNvPr id="3" name="2 Marcador de contenido"/>
+          <p:cNvSpPr>
+            <a:spLocks noGrp="1"/>
+          </p:cNvSpPr>
+          <p:nvPr>
+            <p:ph idx="1"/>
+          </p:nvPr>
+        </p:nvSpPr>
+        <p:spPr>
+          <a:xfrm>
+            <a:off x="251520" y="1588296"/>
+            <a:ext cx="8640960" cy="4512496"/>
+          </a:xfrm>
+        </p:spPr>
+        <p:txBody>
+          <a:bodyPr>
+            <a:normAutofit/>
+          </a:bodyPr>
+          <a:lstStyle/>
+          <a:p>
+            <a:pPr algn="just"/>
+            <a:r>
+              <a:rPr lang="en-US" sz="2600" dirty="0" smtClean="0">
+                <a:latin typeface="Times New Roman" pitchFamily="18" charset="0"/>
+                <a:cs typeface="Times New Roman" pitchFamily="18" charset="0"/>
+              </a:rPr>
+              <a:t>Comando para quitar permisos es</a:t>
+            </a:r>
+            <a:r>
+              <a:rPr lang="en-US" sz="2600" dirty="0">
+                <a:latin typeface="Times New Roman" pitchFamily="18" charset="0"/>
+                <a:cs typeface="Times New Roman" pitchFamily="18" charset="0"/>
+              </a:rPr>
+              <a:t> </a:t>
+            </a:r>
+            <a:r>
+              <a:rPr lang="en-US" sz="2600" dirty="0" smtClean="0">
+                <a:latin typeface="Times New Roman" pitchFamily="18" charset="0"/>
+                <a:cs typeface="Times New Roman" pitchFamily="18" charset="0"/>
+              </a:rPr>
+              <a:t>REVOKE</a:t>
+            </a:r>
+            <a:endParaRPr lang="en-US" sz="2600" dirty="0">
+              <a:latin typeface="Times New Roman" pitchFamily="18" charset="0"/>
+              <a:cs typeface="Times New Roman" pitchFamily="18" charset="0"/>
+            </a:endParaRPr>
+          </a:p>
+          <a:p>
+            <a:pPr marL="0" indent="0" algn="just">
+              <a:buNone/>
+            </a:pPr>
+            <a:endParaRPr lang="en-US" sz="2600" dirty="0" smtClean="0">
+              <a:latin typeface="Times New Roman" pitchFamily="18" charset="0"/>
+              <a:cs typeface="Times New Roman" pitchFamily="18" charset="0"/>
+            </a:endParaRPr>
+          </a:p>
+          <a:p>
+            <a:pPr>
+              <a:buNone/>
+            </a:pPr>
+            <a:r>
+              <a:rPr lang="en-US" sz="2600" b="1" dirty="0" smtClean="0">
+                <a:latin typeface="Times New Roman" pitchFamily="18" charset="0"/>
+                <a:cs typeface="Times New Roman" pitchFamily="18" charset="0"/>
+              </a:rPr>
+              <a:t>   </a:t>
+            </a:r>
+            <a:endParaRPr lang="en-US" sz="2600" b="1" dirty="0" smtClean="0">
+              <a:latin typeface="Times New Roman" pitchFamily="18" charset="0"/>
+              <a:cs typeface="Times New Roman" pitchFamily="18" charset="0"/>
+            </a:endParaRPr>
+          </a:p>
+          <a:p>
+            <a:pPr>
+              <a:buNone/>
+            </a:pPr>
+            <a:endParaRPr lang="es-BO" sz="2600" dirty="0" smtClean="0"/>
+          </a:p>
+          <a:p>
+            <a:pPr>
+              <a:buNone/>
+            </a:pPr>
+            <a:endParaRPr lang="es-BO" dirty="0" smtClean="0"/>
+          </a:p>
+          <a:p>
+            <a:pPr>
+              <a:buNone/>
+            </a:pPr>
+            <a:endParaRPr lang="es-BO" dirty="0" smtClean="0"/>
+          </a:p>
+          <a:p>
+            <a:pPr>
+              <a:buNone/>
+            </a:pPr>
+            <a:endParaRPr lang="es-BO" dirty="0"/>
+          </a:p>
+        </p:txBody>
+      </p:sp>
+      <p:sp>
+        <p:nvSpPr>
+          <p:cNvPr id="6" name="13 Rectángulo"/>
+          <p:cNvSpPr/>
+          <p:nvPr/>
+        </p:nvSpPr>
+        <p:spPr>
+          <a:xfrm>
+            <a:off x="1331640" y="116632"/>
+            <a:ext cx="6828813" cy="1015663"/>
+          </a:xfrm>
+          <a:prstGeom prst="rect">
+            <a:avLst/>
+          </a:prstGeom>
+          <a:noFill/>
+        </p:spPr>
+        <p:txBody>
+          <a:bodyPr wrap="square" lIns="91440" tIns="45720" rIns="91440" bIns="45720">
+            <a:spAutoFit/>
+          </a:bodyPr>
+          <a:lstStyle/>
+          <a:p>
+            <a:pPr algn="ctr"/>
+            <a:r>
+              <a:rPr lang="es-ES" sz="3000" b="1" spc="50" dirty="0" smtClean="0">
+                <a:ln w="0"/>
+                <a:solidFill>
+                  <a:srgbClr val="C00000"/>
+                </a:solidFill>
+                <a:effectLst>
+                  <a:innerShdw blurRad="63500" dist="50800" dir="13500000">
+                    <a:srgbClr val="000000">
+                      <a:alpha val="50000"/>
+                    </a:srgbClr>
+                  </a:innerShdw>
+                </a:effectLst>
+                <a:latin typeface="Times New Roman" panose="02020603050405020304" pitchFamily="18" charset="0"/>
+                <a:cs typeface="Times New Roman" panose="02020603050405020304" pitchFamily="18" charset="0"/>
+              </a:rPr>
+              <a:t>POSTGRES:ADMINISTRACION DE BASE DE DATOS</a:t>
+            </a:r>
+            <a:endParaRPr lang="es-BO" sz="3000" b="1" spc="50" dirty="0">
+              <a:ln w="0"/>
+              <a:solidFill>
+                <a:srgbClr val="C00000"/>
+              </a:solidFill>
+              <a:effectLst>
+                <a:innerShdw blurRad="63500" dist="50800" dir="13500000">
+                  <a:srgbClr val="000000">
+                    <a:alpha val="50000"/>
+                  </a:srgbClr>
+                </a:innerShdw>
+              </a:effectLst>
+              <a:latin typeface="Times New Roman" panose="02020603050405020304" pitchFamily="18" charset="0"/>
+              <a:cs typeface="Times New Roman" panose="02020603050405020304" pitchFamily="18" charset="0"/>
+            </a:endParaRPr>
+          </a:p>
+        </p:txBody>
+      </p:sp>
+      <p:pic>
+        <p:nvPicPr>
+          <p:cNvPr id="5" name="Imagen 4"/>
+          <p:cNvPicPr>
+            <a:picLocks noChangeAspect="1"/>
+          </p:cNvPicPr>
+          <p:nvPr/>
+        </p:nvPicPr>
+        <p:blipFill>
+          <a:blip r:embed="rId2"/>
+          <a:stretch>
+            <a:fillRect/>
+          </a:stretch>
+        </p:blipFill>
+        <p:spPr>
+          <a:xfrm>
+            <a:off x="1129719" y="2204864"/>
+            <a:ext cx="6884561" cy="2000327"/>
+          </a:xfrm>
+          <a:prstGeom prst="rect">
+            <a:avLst/>
+          </a:prstGeom>
+        </p:spPr>
+      </p:pic>
+      <p:pic>
+        <p:nvPicPr>
+          <p:cNvPr id="7" name="Imagen 6"/>
+          <p:cNvPicPr>
+            <a:picLocks noChangeAspect="1"/>
+          </p:cNvPicPr>
+          <p:nvPr/>
+        </p:nvPicPr>
+        <p:blipFill>
+          <a:blip r:embed="rId3"/>
+          <a:stretch>
+            <a:fillRect/>
+          </a:stretch>
+        </p:blipFill>
+        <p:spPr>
+          <a:xfrm>
+            <a:off x="2110094" y="4356818"/>
+            <a:ext cx="4923809" cy="1533333"/>
+          </a:xfrm>
+          <a:prstGeom prst="rect">
+            <a:avLst/>
+          </a:prstGeom>
+        </p:spPr>
+      </p:pic>
+    </p:spTree>
+    <p:extLst>
+      <p:ext uri="{BB962C8B-B14F-4D97-AF65-F5344CB8AC3E}">
+        <p14:creationId xmlns:p14="http://schemas.microsoft.com/office/powerpoint/2010/main" val="4034323692"/>
+      </p:ext>
+    </p:extLst>
+  </p:cSld>
+  <p:clrMapOvr>
+    <a:masterClrMapping/>
+  </p:clrMapOvr>
+  <p:timing>
+    <p:tnLst>
+      <p:par>
+        <p:cTn id="1" dur="indefinite" restart="never" nodeType="tmRoot"/>
+      </p:par>
+    </p:tnLst>
+  </p:timing>
+</p:sld>
+</file>
+
+<file path=ppt/slides/slide23.xml><?xml version="1.0" encoding="utf-8"?>
+<p:sld xmlns:a="http://schemas.openxmlformats.org/drawingml/2006/main" xmlns:r="http://schemas.openxmlformats.org/officeDocument/2006/relationships" xmlns:p="http://schemas.openxmlformats.org/presentationml/2006/main">
+  <p:cSld>
+    <p:spTree>
+      <p:nvGrpSpPr>
+        <p:cNvPr id="1" name=""/>
+        <p:cNvGrpSpPr/>
+        <p:nvPr/>
+      </p:nvGrpSpPr>
+      <p:grpSpPr>
+        <a:xfrm>
+          <a:off x="0" y="0"/>
+          <a:ext cx="0" cy="0"/>
+          <a:chOff x="0" y="0"/>
+          <a:chExt cx="0" cy="0"/>
+        </a:xfrm>
+      </p:grpSpPr>
+      <p:sp>
+        <p:nvSpPr>
+          <p:cNvPr id="88066" name="Rectangle 2"/>
+          <p:cNvSpPr>
+            <a:spLocks noGrp="1" noChangeArrowheads="1"/>
+          </p:cNvSpPr>
+          <p:nvPr>
+            <p:ph idx="1"/>
+          </p:nvPr>
+        </p:nvSpPr>
+        <p:spPr>
+          <a:xfrm>
+            <a:off x="395535" y="1881608"/>
+            <a:ext cx="8424862" cy="4968552"/>
+          </a:xfrm>
+        </p:spPr>
+        <p:txBody>
+          <a:bodyPr/>
+          <a:lstStyle/>
+          <a:p>
+            <a:pPr algn="just" eaLnBrk="1" hangingPunct="1">
+              <a:lnSpc>
+                <a:spcPct val="90000"/>
+              </a:lnSpc>
+              <a:defRPr/>
+            </a:pPr>
+            <a:r>
+              <a:rPr lang="es-ES" sz="2600" b="1" dirty="0" smtClean="0">
+                <a:solidFill>
+                  <a:srgbClr val="0070C0"/>
+                </a:solidFill>
+                <a:latin typeface="Times New Roman" pitchFamily="18" charset="0"/>
+                <a:cs typeface="Times New Roman" pitchFamily="18" charset="0"/>
+              </a:rPr>
+              <a:t>Creando tablas (clases) en </a:t>
+            </a:r>
+            <a:r>
+              <a:rPr lang="es-ES" sz="2600" b="1" dirty="0" err="1" smtClean="0">
+                <a:solidFill>
+                  <a:srgbClr val="0070C0"/>
+                </a:solidFill>
+                <a:latin typeface="Times New Roman" pitchFamily="18" charset="0"/>
+                <a:cs typeface="Times New Roman" pitchFamily="18" charset="0"/>
+              </a:rPr>
+              <a:t>PostgreSQL</a:t>
+            </a:r>
+            <a:endParaRPr lang="es-ES" sz="2600" dirty="0" smtClean="0">
+              <a:effectLst/>
+              <a:latin typeface="Times New Roman" pitchFamily="18" charset="0"/>
+              <a:cs typeface="Times New Roman" pitchFamily="18" charset="0"/>
+            </a:endParaRPr>
+          </a:p>
+          <a:p>
+            <a:pPr lvl="1" algn="just" eaLnBrk="1" hangingPunct="1">
+              <a:lnSpc>
+                <a:spcPct val="90000"/>
+              </a:lnSpc>
+              <a:buFont typeface="Wingdings" pitchFamily="2" charset="2"/>
+              <a:buNone/>
+              <a:defRPr/>
+            </a:pPr>
+            <a:r>
+              <a:rPr lang="es-ES" sz="2600" dirty="0" err="1" smtClean="0">
+                <a:effectLst/>
+                <a:latin typeface="Times New Roman" pitchFamily="18" charset="0"/>
+                <a:cs typeface="Times New Roman" pitchFamily="18" charset="0"/>
+              </a:rPr>
+              <a:t>PostgreSQL</a:t>
+            </a:r>
+            <a:r>
+              <a:rPr lang="es-ES" sz="2600" dirty="0" smtClean="0">
+                <a:effectLst/>
+                <a:latin typeface="Times New Roman" pitchFamily="18" charset="0"/>
+                <a:cs typeface="Times New Roman" pitchFamily="18" charset="0"/>
+              </a:rPr>
+              <a:t> SQL soporta los tipos habituales de SQL como: </a:t>
+            </a:r>
+            <a:r>
+              <a:rPr lang="es-ES" sz="2600" dirty="0" err="1" smtClean="0">
+                <a:effectLst/>
+                <a:latin typeface="Times New Roman" pitchFamily="18" charset="0"/>
+                <a:cs typeface="Times New Roman" pitchFamily="18" charset="0"/>
+              </a:rPr>
+              <a:t>integer</a:t>
+            </a:r>
+            <a:r>
+              <a:rPr lang="es-ES" sz="2600" dirty="0" smtClean="0">
+                <a:effectLst/>
+                <a:latin typeface="Times New Roman" pitchFamily="18" charset="0"/>
+                <a:cs typeface="Times New Roman" pitchFamily="18" charset="0"/>
+              </a:rPr>
+              <a:t>, </a:t>
+            </a:r>
+            <a:r>
+              <a:rPr lang="es-ES" sz="2600" dirty="0" err="1" smtClean="0">
+                <a:effectLst/>
+                <a:latin typeface="Times New Roman" pitchFamily="18" charset="0"/>
+                <a:cs typeface="Times New Roman" pitchFamily="18" charset="0"/>
+              </a:rPr>
+              <a:t>float</a:t>
+            </a:r>
+            <a:r>
+              <a:rPr lang="es-ES" sz="2600" dirty="0" smtClean="0">
+                <a:effectLst/>
+                <a:latin typeface="Times New Roman" pitchFamily="18" charset="0"/>
+                <a:cs typeface="Times New Roman" pitchFamily="18" charset="0"/>
+              </a:rPr>
+              <a:t>, real, </a:t>
+            </a:r>
+            <a:r>
+              <a:rPr lang="es-ES" sz="2600" dirty="0" err="1" smtClean="0">
+                <a:effectLst/>
+                <a:latin typeface="Times New Roman" pitchFamily="18" charset="0"/>
+                <a:cs typeface="Times New Roman" pitchFamily="18" charset="0"/>
+              </a:rPr>
+              <a:t>smallint</a:t>
+            </a:r>
+            <a:r>
+              <a:rPr lang="es-ES" sz="2600" dirty="0" smtClean="0">
+                <a:effectLst/>
+                <a:latin typeface="Times New Roman" pitchFamily="18" charset="0"/>
+                <a:cs typeface="Times New Roman" pitchFamily="18" charset="0"/>
+              </a:rPr>
+              <a:t>, </a:t>
+            </a:r>
+            <a:r>
+              <a:rPr lang="es-ES" sz="2600" dirty="0" err="1" smtClean="0">
+                <a:effectLst/>
+                <a:latin typeface="Times New Roman" pitchFamily="18" charset="0"/>
+                <a:cs typeface="Times New Roman" pitchFamily="18" charset="0"/>
+              </a:rPr>
+              <a:t>char</a:t>
+            </a:r>
+            <a:r>
+              <a:rPr lang="es-ES" sz="2600" dirty="0" smtClean="0">
+                <a:effectLst/>
+                <a:latin typeface="Times New Roman" pitchFamily="18" charset="0"/>
+                <a:cs typeface="Times New Roman" pitchFamily="18" charset="0"/>
+              </a:rPr>
+              <a:t>(N), </a:t>
+            </a:r>
+            <a:r>
+              <a:rPr lang="es-ES" sz="2600" dirty="0" err="1" smtClean="0">
+                <a:effectLst/>
+                <a:latin typeface="Times New Roman" pitchFamily="18" charset="0"/>
+                <a:cs typeface="Times New Roman" pitchFamily="18" charset="0"/>
+              </a:rPr>
+              <a:t>varchar</a:t>
+            </a:r>
+            <a:r>
+              <a:rPr lang="es-ES" sz="2600" dirty="0" smtClean="0">
+                <a:effectLst/>
+                <a:latin typeface="Times New Roman" pitchFamily="18" charset="0"/>
+                <a:cs typeface="Times New Roman" pitchFamily="18" charset="0"/>
+              </a:rPr>
+              <a:t>(N), date, time, and </a:t>
+            </a:r>
+            <a:r>
+              <a:rPr lang="es-ES" sz="2600" dirty="0" err="1" smtClean="0">
+                <a:effectLst/>
+                <a:latin typeface="Times New Roman" pitchFamily="18" charset="0"/>
+                <a:cs typeface="Times New Roman" pitchFamily="18" charset="0"/>
+              </a:rPr>
+              <a:t>timestamp</a:t>
+            </a:r>
+            <a:r>
+              <a:rPr lang="es-ES" sz="2600" dirty="0" smtClean="0">
+                <a:effectLst/>
+                <a:latin typeface="Times New Roman" pitchFamily="18" charset="0"/>
+                <a:cs typeface="Times New Roman" pitchFamily="18" charset="0"/>
+              </a:rPr>
+              <a:t>, así como otros de tipo general.</a:t>
+            </a:r>
+            <a:endParaRPr lang="es-ES" sz="2600" dirty="0" smtClean="0">
+              <a:latin typeface="Times New Roman" pitchFamily="18" charset="0"/>
+              <a:cs typeface="Times New Roman" pitchFamily="18" charset="0"/>
+            </a:endParaRPr>
+          </a:p>
+          <a:p>
+            <a:pPr lvl="1" algn="just" eaLnBrk="1" hangingPunct="1">
+              <a:lnSpc>
+                <a:spcPct val="90000"/>
+              </a:lnSpc>
+              <a:buFont typeface="Wingdings" pitchFamily="2" charset="2"/>
+              <a:buNone/>
+              <a:defRPr/>
+            </a:pPr>
+            <a:endParaRPr lang="es-ES" sz="2600" dirty="0" smtClean="0">
+              <a:latin typeface="Times New Roman" pitchFamily="18" charset="0"/>
+              <a:cs typeface="Times New Roman" pitchFamily="18" charset="0"/>
+            </a:endParaRPr>
+          </a:p>
+          <a:p>
+            <a:pPr lvl="1" algn="just" eaLnBrk="1" hangingPunct="1">
+              <a:lnSpc>
+                <a:spcPct val="90000"/>
+              </a:lnSpc>
+              <a:buFont typeface="Wingdings" pitchFamily="2" charset="2"/>
+              <a:buNone/>
+              <a:defRPr/>
+            </a:pPr>
+            <a:r>
+              <a:rPr lang="es-ES" sz="2600" dirty="0" smtClean="0">
+                <a:latin typeface="Times New Roman" pitchFamily="18" charset="0"/>
+                <a:cs typeface="Times New Roman" pitchFamily="18" charset="0"/>
+              </a:rPr>
+              <a:t>Ejemplo.</a:t>
+            </a:r>
+          </a:p>
+          <a:p>
+            <a:pPr lvl="1" algn="just" eaLnBrk="1" hangingPunct="1">
+              <a:lnSpc>
+                <a:spcPct val="90000"/>
+              </a:lnSpc>
+              <a:buFont typeface="Wingdings" pitchFamily="2" charset="2"/>
+              <a:buNone/>
+              <a:defRPr/>
+            </a:pPr>
+            <a:r>
+              <a:rPr lang="es-ES" sz="2600" dirty="0" err="1" smtClean="0">
+                <a:solidFill>
+                  <a:srgbClr val="0070C0"/>
+                </a:solidFill>
+                <a:latin typeface="Times New Roman" pitchFamily="18" charset="0"/>
+                <a:cs typeface="Times New Roman" pitchFamily="18" charset="0"/>
+              </a:rPr>
+              <a:t>create</a:t>
+            </a:r>
+            <a:r>
+              <a:rPr lang="es-ES" sz="2600" dirty="0" smtClean="0">
+                <a:solidFill>
+                  <a:srgbClr val="0070C0"/>
+                </a:solidFill>
+                <a:latin typeface="Times New Roman" pitchFamily="18" charset="0"/>
+                <a:cs typeface="Times New Roman" pitchFamily="18" charset="0"/>
+              </a:rPr>
+              <a:t> </a:t>
+            </a:r>
+            <a:r>
+              <a:rPr lang="es-ES" sz="2600" dirty="0" err="1" smtClean="0">
+                <a:solidFill>
+                  <a:srgbClr val="0070C0"/>
+                </a:solidFill>
+                <a:latin typeface="Times New Roman" pitchFamily="18" charset="0"/>
+                <a:cs typeface="Times New Roman" pitchFamily="18" charset="0"/>
+              </a:rPr>
+              <a:t>table</a:t>
+            </a:r>
+            <a:r>
+              <a:rPr lang="es-ES" sz="2600" dirty="0" smtClean="0">
+                <a:solidFill>
+                  <a:srgbClr val="0070C0"/>
+                </a:solidFill>
+                <a:latin typeface="Times New Roman" pitchFamily="18" charset="0"/>
+                <a:cs typeface="Times New Roman" pitchFamily="18" charset="0"/>
+              </a:rPr>
+              <a:t> DOCENTE(</a:t>
+            </a:r>
+            <a:r>
+              <a:rPr lang="es-ES" sz="2600" dirty="0" err="1" smtClean="0">
+                <a:solidFill>
+                  <a:srgbClr val="0070C0"/>
+                </a:solidFill>
+                <a:latin typeface="Times New Roman" pitchFamily="18" charset="0"/>
+                <a:cs typeface="Times New Roman" pitchFamily="18" charset="0"/>
+              </a:rPr>
+              <a:t>cod_doc</a:t>
+            </a:r>
+            <a:r>
+              <a:rPr lang="es-ES" sz="2600" dirty="0" smtClean="0">
+                <a:solidFill>
+                  <a:srgbClr val="0070C0"/>
+                </a:solidFill>
+                <a:latin typeface="Times New Roman" pitchFamily="18" charset="0"/>
+                <a:cs typeface="Times New Roman" pitchFamily="18" charset="0"/>
+              </a:rPr>
+              <a:t> </a:t>
+            </a:r>
+            <a:r>
+              <a:rPr lang="es-ES" sz="2600" dirty="0" err="1" smtClean="0">
+                <a:solidFill>
+                  <a:srgbClr val="0070C0"/>
+                </a:solidFill>
+                <a:latin typeface="Times New Roman" pitchFamily="18" charset="0"/>
+                <a:cs typeface="Times New Roman" pitchFamily="18" charset="0"/>
+              </a:rPr>
+              <a:t>int</a:t>
+            </a:r>
+            <a:r>
+              <a:rPr lang="es-ES" sz="2600" dirty="0" smtClean="0">
+                <a:solidFill>
+                  <a:srgbClr val="0070C0"/>
+                </a:solidFill>
+                <a:latin typeface="Times New Roman" pitchFamily="18" charset="0"/>
+                <a:cs typeface="Times New Roman" pitchFamily="18" charset="0"/>
+              </a:rPr>
+              <a:t>, </a:t>
+            </a:r>
+            <a:r>
+              <a:rPr lang="es-ES" sz="2600" dirty="0" err="1" smtClean="0">
+                <a:solidFill>
+                  <a:srgbClr val="0070C0"/>
+                </a:solidFill>
+                <a:latin typeface="Times New Roman" pitchFamily="18" charset="0"/>
+                <a:cs typeface="Times New Roman" pitchFamily="18" charset="0"/>
+              </a:rPr>
+              <a:t>nombre_doc</a:t>
+            </a:r>
+            <a:r>
+              <a:rPr lang="es-ES" sz="2600" dirty="0" smtClean="0">
+                <a:solidFill>
+                  <a:srgbClr val="0070C0"/>
+                </a:solidFill>
+                <a:latin typeface="Times New Roman" pitchFamily="18" charset="0"/>
+                <a:cs typeface="Times New Roman" pitchFamily="18" charset="0"/>
+              </a:rPr>
+              <a:t> </a:t>
+            </a:r>
+            <a:r>
+              <a:rPr lang="es-ES" sz="2600" dirty="0" err="1" smtClean="0">
+                <a:solidFill>
+                  <a:srgbClr val="0070C0"/>
+                </a:solidFill>
+                <a:latin typeface="Times New Roman" pitchFamily="18" charset="0"/>
+                <a:cs typeface="Times New Roman" pitchFamily="18" charset="0"/>
+              </a:rPr>
+              <a:t>varchar</a:t>
+            </a:r>
+            <a:r>
+              <a:rPr lang="es-ES" sz="2600" dirty="0" smtClean="0">
+                <a:solidFill>
+                  <a:srgbClr val="0070C0"/>
+                </a:solidFill>
+                <a:latin typeface="Times New Roman" pitchFamily="18" charset="0"/>
+                <a:cs typeface="Times New Roman" pitchFamily="18" charset="0"/>
+              </a:rPr>
+              <a:t>(30),</a:t>
+            </a:r>
+            <a:r>
+              <a:rPr lang="es-ES" sz="2600" dirty="0" err="1" smtClean="0">
+                <a:solidFill>
+                  <a:srgbClr val="0070C0"/>
+                </a:solidFill>
+                <a:latin typeface="Times New Roman" pitchFamily="18" charset="0"/>
+                <a:cs typeface="Times New Roman" pitchFamily="18" charset="0"/>
+              </a:rPr>
+              <a:t>apellido_pat</a:t>
+            </a:r>
+            <a:r>
+              <a:rPr lang="es-ES" sz="2600" dirty="0" smtClean="0">
+                <a:solidFill>
+                  <a:srgbClr val="0070C0"/>
+                </a:solidFill>
+                <a:latin typeface="Times New Roman" pitchFamily="18" charset="0"/>
+                <a:cs typeface="Times New Roman" pitchFamily="18" charset="0"/>
+              </a:rPr>
+              <a:t> </a:t>
+            </a:r>
+            <a:r>
+              <a:rPr lang="es-ES" sz="2600" dirty="0" err="1" smtClean="0">
+                <a:solidFill>
+                  <a:srgbClr val="0070C0"/>
+                </a:solidFill>
+                <a:latin typeface="Times New Roman" pitchFamily="18" charset="0"/>
+                <a:cs typeface="Times New Roman" pitchFamily="18" charset="0"/>
+              </a:rPr>
+              <a:t>varchar</a:t>
+            </a:r>
+            <a:r>
+              <a:rPr lang="es-ES" sz="2600" dirty="0" smtClean="0">
+                <a:solidFill>
+                  <a:srgbClr val="0070C0"/>
+                </a:solidFill>
+                <a:latin typeface="Times New Roman" pitchFamily="18" charset="0"/>
+                <a:cs typeface="Times New Roman" pitchFamily="18" charset="0"/>
+              </a:rPr>
+              <a:t>(30), </a:t>
+            </a:r>
+            <a:r>
+              <a:rPr lang="es-ES" sz="2600" dirty="0" err="1" smtClean="0">
+                <a:solidFill>
+                  <a:srgbClr val="0070C0"/>
+                </a:solidFill>
+                <a:latin typeface="Times New Roman" pitchFamily="18" charset="0"/>
+                <a:cs typeface="Times New Roman" pitchFamily="18" charset="0"/>
+              </a:rPr>
+              <a:t>apellido_mat</a:t>
+            </a:r>
+            <a:r>
+              <a:rPr lang="es-ES" sz="2600" dirty="0" smtClean="0">
+                <a:solidFill>
+                  <a:srgbClr val="0070C0"/>
+                </a:solidFill>
+                <a:latin typeface="Times New Roman" pitchFamily="18" charset="0"/>
+                <a:cs typeface="Times New Roman" pitchFamily="18" charset="0"/>
+              </a:rPr>
+              <a:t> </a:t>
+            </a:r>
+            <a:r>
+              <a:rPr lang="es-ES" sz="2600" dirty="0" err="1" smtClean="0">
+                <a:solidFill>
+                  <a:srgbClr val="0070C0"/>
+                </a:solidFill>
+                <a:latin typeface="Times New Roman" pitchFamily="18" charset="0"/>
+                <a:cs typeface="Times New Roman" pitchFamily="18" charset="0"/>
+              </a:rPr>
+              <a:t>varchar</a:t>
+            </a:r>
+            <a:r>
+              <a:rPr lang="es-ES" sz="2600" dirty="0" smtClean="0">
+                <a:solidFill>
+                  <a:srgbClr val="0070C0"/>
+                </a:solidFill>
+                <a:latin typeface="Times New Roman" pitchFamily="18" charset="0"/>
+                <a:cs typeface="Times New Roman" pitchFamily="18" charset="0"/>
+              </a:rPr>
+              <a:t>(30),</a:t>
+            </a:r>
+            <a:r>
+              <a:rPr lang="es-ES" sz="2600" dirty="0" err="1" smtClean="0">
+                <a:solidFill>
+                  <a:srgbClr val="0070C0"/>
+                </a:solidFill>
+                <a:latin typeface="Times New Roman" pitchFamily="18" charset="0"/>
+                <a:cs typeface="Times New Roman" pitchFamily="18" charset="0"/>
+              </a:rPr>
+              <a:t>profesion</a:t>
+            </a:r>
+            <a:r>
+              <a:rPr lang="es-ES" sz="2600" dirty="0" smtClean="0">
+                <a:solidFill>
+                  <a:srgbClr val="0070C0"/>
+                </a:solidFill>
+                <a:latin typeface="Times New Roman" pitchFamily="18" charset="0"/>
+                <a:cs typeface="Times New Roman" pitchFamily="18" charset="0"/>
+              </a:rPr>
+              <a:t> </a:t>
+            </a:r>
+            <a:r>
+              <a:rPr lang="es-ES" sz="2600" dirty="0" err="1" smtClean="0">
+                <a:solidFill>
+                  <a:srgbClr val="0070C0"/>
+                </a:solidFill>
+                <a:latin typeface="Times New Roman" pitchFamily="18" charset="0"/>
+                <a:cs typeface="Times New Roman" pitchFamily="18" charset="0"/>
+              </a:rPr>
+              <a:t>varchar</a:t>
+            </a:r>
+            <a:r>
+              <a:rPr lang="es-ES" sz="2600" dirty="0" smtClean="0">
+                <a:solidFill>
+                  <a:srgbClr val="0070C0"/>
+                </a:solidFill>
+                <a:latin typeface="Times New Roman" pitchFamily="18" charset="0"/>
+                <a:cs typeface="Times New Roman" pitchFamily="18" charset="0"/>
+              </a:rPr>
+              <a:t>(30));</a:t>
+            </a:r>
+            <a:r>
+              <a:rPr lang="es-ES" sz="2000" i="1" dirty="0" smtClean="0">
+                <a:effectLst/>
+              </a:rPr>
+              <a:t>	</a:t>
+            </a:r>
+          </a:p>
+        </p:txBody>
+      </p:sp>
+      <p:sp>
+        <p:nvSpPr>
+          <p:cNvPr id="6" name="13 Rectángulo"/>
+          <p:cNvSpPr/>
+          <p:nvPr/>
+        </p:nvSpPr>
+        <p:spPr>
+          <a:xfrm>
+            <a:off x="1193560" y="116632"/>
+            <a:ext cx="6828813" cy="1015663"/>
+          </a:xfrm>
+          <a:prstGeom prst="rect">
+            <a:avLst/>
+          </a:prstGeom>
+          <a:noFill/>
+        </p:spPr>
+        <p:txBody>
+          <a:bodyPr wrap="square" lIns="91440" tIns="45720" rIns="91440" bIns="45720">
+            <a:spAutoFit/>
+          </a:bodyPr>
+          <a:lstStyle/>
+          <a:p>
+            <a:pPr algn="ctr"/>
+            <a:r>
+              <a:rPr lang="es-ES" sz="3000" b="1" spc="50" dirty="0" smtClean="0">
+                <a:ln w="0"/>
+                <a:solidFill>
+                  <a:srgbClr val="C00000"/>
+                </a:solidFill>
+                <a:effectLst>
+                  <a:innerShdw blurRad="63500" dist="50800" dir="13500000">
+                    <a:srgbClr val="000000">
+                      <a:alpha val="50000"/>
+                    </a:srgbClr>
+                  </a:innerShdw>
+                </a:effectLst>
+                <a:latin typeface="Times New Roman" panose="02020603050405020304" pitchFamily="18" charset="0"/>
+                <a:cs typeface="Times New Roman" panose="02020603050405020304" pitchFamily="18" charset="0"/>
+              </a:rPr>
+              <a:t>POSTGRES:ADMINISTRACION DE BASE DE DATOS</a:t>
+            </a:r>
+            <a:endParaRPr lang="es-BO" sz="3000" b="1" spc="50" dirty="0">
+              <a:ln w="0"/>
+              <a:solidFill>
+                <a:srgbClr val="C00000"/>
+              </a:solidFill>
+              <a:effectLst>
+                <a:innerShdw blurRad="63500" dist="50800" dir="13500000">
+                  <a:srgbClr val="000000">
+                    <a:alpha val="50000"/>
+                  </a:srgbClr>
+                </a:innerShdw>
+              </a:effectLst>
+              <a:latin typeface="Times New Roman" panose="02020603050405020304" pitchFamily="18" charset="0"/>
+              <a:cs typeface="Times New Roman" panose="02020603050405020304" pitchFamily="18" charset="0"/>
+            </a:endParaRPr>
+          </a:p>
+        </p:txBody>
+      </p:sp>
+    </p:spTree>
+    <p:extLst>
+      <p:ext uri="{BB962C8B-B14F-4D97-AF65-F5344CB8AC3E}">
+        <p14:creationId xmlns:p14="http://schemas.microsoft.com/office/powerpoint/2010/main" val="2852841427"/>
+      </p:ext>
+    </p:extLst>
+  </p:cSld>
+  <p:clrMapOvr>
+    <a:masterClrMapping/>
+  </p:clrMapOvr>
+  <p:timing>
+    <p:tnLst>
+      <p:par>
+        <p:cTn id="1" dur="indefinite" restart="never" nodeType="tmRoot"/>
+      </p:par>
+    </p:tnLst>
+  </p:timing>
+</p:sld>
+</file>
+
+<file path=ppt/slides/slide24.xml><?xml version="1.0" encoding="utf-8"?>
+<p:sld xmlns:a="http://schemas.openxmlformats.org/drawingml/2006/main" xmlns:r="http://schemas.openxmlformats.org/officeDocument/2006/relationships" xmlns:p="http://schemas.openxmlformats.org/presentationml/2006/main">
+  <p:cSld>
+    <p:spTree>
+      <p:nvGrpSpPr>
+        <p:cNvPr id="1" name=""/>
+        <p:cNvGrpSpPr/>
+        <p:nvPr/>
+      </p:nvGrpSpPr>
+      <p:grpSpPr>
+        <a:xfrm>
+          <a:off x="0" y="0"/>
+          <a:ext cx="0" cy="0"/>
+          <a:chOff x="0" y="0"/>
+          <a:chExt cx="0" cy="0"/>
+        </a:xfrm>
+      </p:grpSpPr>
+      <p:sp>
+        <p:nvSpPr>
+          <p:cNvPr id="3" name="2 Marcador de contenido"/>
+          <p:cNvSpPr>
+            <a:spLocks noGrp="1"/>
+          </p:cNvSpPr>
+          <p:nvPr>
+            <p:ph idx="1"/>
+          </p:nvPr>
+        </p:nvSpPr>
+        <p:spPr>
+          <a:xfrm>
+            <a:off x="333287" y="1595211"/>
+            <a:ext cx="8429684" cy="4786117"/>
+          </a:xfrm>
+        </p:spPr>
+        <p:txBody>
+          <a:bodyPr>
+            <a:normAutofit/>
+          </a:bodyPr>
+          <a:lstStyle/>
+          <a:p>
+            <a:pPr algn="just"/>
+            <a:r>
+              <a:rPr lang="es-BO" sz="2600" dirty="0" smtClean="0">
+                <a:latin typeface="Times New Roman" pitchFamily="18" charset="0"/>
+                <a:cs typeface="Times New Roman" pitchFamily="18" charset="0"/>
+              </a:rPr>
+              <a:t>Para poder eliminar un objeto  ya sea base de </a:t>
+            </a:r>
+            <a:r>
+              <a:rPr lang="es-BO" sz="2600" dirty="0" err="1" smtClean="0">
+                <a:latin typeface="Times New Roman" pitchFamily="18" charset="0"/>
+                <a:cs typeface="Times New Roman" pitchFamily="18" charset="0"/>
+              </a:rPr>
+              <a:t>datos,tablas</a:t>
+            </a:r>
+            <a:r>
+              <a:rPr lang="es-BO" sz="2600" dirty="0" smtClean="0">
+                <a:latin typeface="Times New Roman" pitchFamily="18" charset="0"/>
+                <a:cs typeface="Times New Roman" pitchFamily="18" charset="0"/>
+              </a:rPr>
+              <a:t> se utiliza el comando DROP de la siguiente manera</a:t>
+            </a:r>
+            <a:r>
+              <a:rPr lang="en-US" sz="2600" dirty="0" smtClean="0">
+                <a:latin typeface="Times New Roman" pitchFamily="18" charset="0"/>
+                <a:cs typeface="Times New Roman" pitchFamily="18" charset="0"/>
+              </a:rPr>
+              <a:t>:</a:t>
+            </a:r>
+          </a:p>
+          <a:p>
+            <a:pPr algn="just">
+              <a:buNone/>
+            </a:pPr>
+            <a:r>
+              <a:rPr lang="en-US" sz="2600" b="1" dirty="0" smtClean="0">
+                <a:solidFill>
+                  <a:srgbClr val="0070C0"/>
+                </a:solidFill>
+                <a:latin typeface="Times New Roman" pitchFamily="18" charset="0"/>
+                <a:cs typeface="Times New Roman" pitchFamily="18" charset="0"/>
+              </a:rPr>
+              <a:t>  </a:t>
+            </a:r>
+            <a:r>
+              <a:rPr lang="en-US" sz="2400" b="1" dirty="0" smtClean="0">
+                <a:solidFill>
+                  <a:srgbClr val="0070C0"/>
+                </a:solidFill>
+                <a:latin typeface="Times New Roman" pitchFamily="18" charset="0"/>
+                <a:cs typeface="Times New Roman" pitchFamily="18" charset="0"/>
+              </a:rPr>
+              <a:t>DROP DATABASE [NOMBRE DE LA BASE DE DATOS];</a:t>
+            </a:r>
+          </a:p>
+          <a:p>
+            <a:pPr>
+              <a:buNone/>
+            </a:pPr>
+            <a:r>
+              <a:rPr lang="en-US" sz="2400" b="1" dirty="0" smtClean="0">
+                <a:solidFill>
+                  <a:srgbClr val="0070C0"/>
+                </a:solidFill>
+                <a:latin typeface="Times New Roman" pitchFamily="18" charset="0"/>
+                <a:cs typeface="Times New Roman" pitchFamily="18" charset="0"/>
+              </a:rPr>
+              <a:t>  DROP TABLE[NOMBRE DE LA TABLA];</a:t>
+            </a:r>
+            <a:endParaRPr lang="es-BO" sz="2400" b="1" dirty="0" smtClean="0">
+              <a:solidFill>
+                <a:srgbClr val="0070C0"/>
+              </a:solidFill>
+              <a:latin typeface="Times New Roman" pitchFamily="18" charset="0"/>
+              <a:cs typeface="Times New Roman" pitchFamily="18" charset="0"/>
+            </a:endParaRPr>
+          </a:p>
+          <a:p>
+            <a:r>
+              <a:rPr lang="es-BO" sz="2600" dirty="0" smtClean="0">
+                <a:latin typeface="Times New Roman" pitchFamily="18" charset="0"/>
+                <a:cs typeface="Times New Roman" pitchFamily="18" charset="0"/>
+              </a:rPr>
+              <a:t>Para poder modificar datos de un objeto ya sea base de datos usuarios, tablas se utiliza la sentencia ALTER</a:t>
+            </a:r>
+          </a:p>
+          <a:p>
+            <a:pPr>
+              <a:buNone/>
+            </a:pPr>
+            <a:endParaRPr lang="es-BO" sz="2600" b="1" dirty="0" smtClean="0">
+              <a:latin typeface="Times New Roman" pitchFamily="18" charset="0"/>
+              <a:cs typeface="Times New Roman" pitchFamily="18" charset="0"/>
+            </a:endParaRPr>
+          </a:p>
+          <a:p>
+            <a:pPr marL="182563" indent="3175">
+              <a:buNone/>
+            </a:pPr>
+            <a:r>
+              <a:rPr lang="es-BO" sz="2400" b="1" dirty="0" smtClean="0">
+                <a:solidFill>
+                  <a:srgbClr val="0070C0"/>
+                </a:solidFill>
+                <a:latin typeface="Times New Roman" pitchFamily="18" charset="0"/>
+                <a:cs typeface="Times New Roman" pitchFamily="18" charset="0"/>
+              </a:rPr>
+              <a:t>ALTER  DATABASE prueba RENAME prueba1;</a:t>
+            </a:r>
+          </a:p>
+          <a:p>
+            <a:pPr marL="182563" indent="3175">
+              <a:buNone/>
+            </a:pPr>
+            <a:r>
+              <a:rPr lang="es-BO" sz="2400" b="1" dirty="0" smtClean="0">
+                <a:solidFill>
+                  <a:srgbClr val="0070C0"/>
+                </a:solidFill>
+                <a:latin typeface="Times New Roman" pitchFamily="18" charset="0"/>
+                <a:cs typeface="Times New Roman" pitchFamily="18" charset="0"/>
+              </a:rPr>
+              <a:t>ALTER  TABLE prueba RENAME prueba1;</a:t>
+            </a:r>
+          </a:p>
+          <a:p>
+            <a:pPr>
+              <a:buNone/>
+            </a:pPr>
+            <a:endParaRPr lang="es-BO" dirty="0" smtClean="0"/>
+          </a:p>
+          <a:p>
+            <a:pPr>
+              <a:buNone/>
+            </a:pPr>
+            <a:endParaRPr lang="es-BO" dirty="0" smtClean="0"/>
+          </a:p>
+          <a:p>
+            <a:pPr>
+              <a:buNone/>
+            </a:pPr>
+            <a:endParaRPr lang="es-BO" dirty="0" smtClean="0"/>
+          </a:p>
+          <a:p>
+            <a:pPr>
+              <a:buNone/>
+            </a:pPr>
+            <a:endParaRPr lang="es-BO" dirty="0"/>
+          </a:p>
+        </p:txBody>
+      </p:sp>
+      <p:sp>
+        <p:nvSpPr>
+          <p:cNvPr id="5" name="13 Rectángulo"/>
+          <p:cNvSpPr/>
+          <p:nvPr/>
+        </p:nvSpPr>
+        <p:spPr>
+          <a:xfrm>
+            <a:off x="1331640" y="116632"/>
+            <a:ext cx="6828813" cy="1015663"/>
+          </a:xfrm>
+          <a:prstGeom prst="rect">
+            <a:avLst/>
+          </a:prstGeom>
+          <a:noFill/>
+        </p:spPr>
+        <p:txBody>
+          <a:bodyPr wrap="square" lIns="91440" tIns="45720" rIns="91440" bIns="45720">
+            <a:spAutoFit/>
+          </a:bodyPr>
+          <a:lstStyle/>
+          <a:p>
+            <a:pPr algn="ctr"/>
+            <a:r>
+              <a:rPr lang="es-ES" sz="3000" b="1" spc="50" dirty="0" smtClean="0">
+                <a:ln w="0"/>
+                <a:solidFill>
+                  <a:srgbClr val="C00000"/>
+                </a:solidFill>
+                <a:effectLst>
+                  <a:innerShdw blurRad="63500" dist="50800" dir="13500000">
+                    <a:srgbClr val="000000">
+                      <a:alpha val="50000"/>
+                    </a:srgbClr>
+                  </a:innerShdw>
+                </a:effectLst>
+                <a:latin typeface="Times New Roman" panose="02020603050405020304" pitchFamily="18" charset="0"/>
+                <a:cs typeface="Times New Roman" panose="02020603050405020304" pitchFamily="18" charset="0"/>
+              </a:rPr>
+              <a:t>POSTGRES:ADMINISTRACION DE BASE DE DATOS</a:t>
+            </a:r>
+            <a:endParaRPr lang="es-BO" sz="3000" b="1" spc="50" dirty="0">
+              <a:ln w="0"/>
+              <a:solidFill>
+                <a:srgbClr val="C00000"/>
+              </a:solidFill>
+              <a:effectLst>
+                <a:innerShdw blurRad="63500" dist="50800" dir="13500000">
+                  <a:srgbClr val="000000">
+                    <a:alpha val="50000"/>
+                  </a:srgbClr>
+                </a:innerShdw>
+              </a:effectLst>
+              <a:latin typeface="Times New Roman" panose="02020603050405020304" pitchFamily="18" charset="0"/>
+              <a:cs typeface="Times New Roman" panose="02020603050405020304" pitchFamily="18" charset="0"/>
+            </a:endParaRPr>
+          </a:p>
+        </p:txBody>
+      </p:sp>
+    </p:spTree>
+    <p:extLst>
+      <p:ext uri="{BB962C8B-B14F-4D97-AF65-F5344CB8AC3E}">
+        <p14:creationId xmlns:p14="http://schemas.microsoft.com/office/powerpoint/2010/main" val="3220270131"/>
+      </p:ext>
+    </p:extLst>
+  </p:cSld>
+  <p:clrMapOvr>
+    <a:masterClrMapping/>
+  </p:clrMapOvr>
+  <p:timing>
+    <p:tnLst>
+      <p:par>
+        <p:cTn id="1" dur="indefinite" restart="never" nodeType="tmRoot"/>
+      </p:par>
+    </p:tnLst>
+  </p:timing>
+</p:sld>
+</file>
+
+<file path=ppt/slides/slide25.xml><?xml version="1.0" encoding="utf-8"?>
+<p:sld xmlns:a="http://schemas.openxmlformats.org/drawingml/2006/main" xmlns:r="http://schemas.openxmlformats.org/officeDocument/2006/relationships" xmlns:p="http://schemas.openxmlformats.org/presentationml/2006/main">
+  <p:cSld>
+    <p:spTree>
+      <p:nvGrpSpPr>
+        <p:cNvPr id="1" name=""/>
+        <p:cNvGrpSpPr/>
+        <p:nvPr/>
+      </p:nvGrpSpPr>
+      <p:grpSpPr>
+        <a:xfrm>
+          <a:off x="0" y="0"/>
+          <a:ext cx="0" cy="0"/>
+          <a:chOff x="0" y="0"/>
+          <a:chExt cx="0" cy="0"/>
+        </a:xfrm>
+      </p:grpSpPr>
+      <p:sp>
+        <p:nvSpPr>
+          <p:cNvPr id="3" name="2 Marcador de contenido"/>
+          <p:cNvSpPr>
+            <a:spLocks noGrp="1"/>
+          </p:cNvSpPr>
+          <p:nvPr>
+            <p:ph sz="quarter" idx="1"/>
+          </p:nvPr>
+        </p:nvSpPr>
+        <p:spPr>
+          <a:xfrm>
+            <a:off x="323528" y="1556792"/>
+            <a:ext cx="8640960" cy="5473844"/>
+          </a:xfrm>
+        </p:spPr>
+        <p:txBody>
+          <a:bodyPr>
+            <a:normAutofit/>
+          </a:bodyPr>
+          <a:lstStyle/>
+          <a:p>
+            <a:pPr algn="just"/>
+            <a:r>
+              <a:rPr lang="es-BO" sz="2200" dirty="0" smtClean="0">
+                <a:latin typeface="Times New Roman" panose="02020603050405020304" pitchFamily="18" charset="0"/>
+                <a:cs typeface="Times New Roman" panose="02020603050405020304" pitchFamily="18" charset="0"/>
+              </a:rPr>
+              <a:t>Para poder eliminar un objeto  ya sea base de datos, usuarios, tablas se utiliza el comando DROP de la siguiente manera:</a:t>
+            </a:r>
+          </a:p>
+          <a:p>
+            <a:pPr algn="just">
+              <a:buNone/>
+            </a:pPr>
+            <a:r>
+              <a:rPr lang="en-US" sz="2200" b="1" dirty="0" smtClean="0">
+                <a:latin typeface="Times New Roman" panose="02020603050405020304" pitchFamily="18" charset="0"/>
+                <a:cs typeface="Times New Roman" panose="02020603050405020304" pitchFamily="18" charset="0"/>
+              </a:rPr>
+              <a:t>	</a:t>
+            </a:r>
+            <a:r>
+              <a:rPr lang="en-US" sz="2200" b="1" dirty="0" smtClean="0">
+                <a:solidFill>
+                  <a:srgbClr val="0070C0"/>
+                </a:solidFill>
+                <a:latin typeface="Times New Roman" panose="02020603050405020304" pitchFamily="18" charset="0"/>
+                <a:cs typeface="Times New Roman" panose="02020603050405020304" pitchFamily="18" charset="0"/>
+              </a:rPr>
+              <a:t>DROP DATABASE [NOMBRE DE LA BASE DE DATOS];</a:t>
+            </a:r>
+          </a:p>
+          <a:p>
+            <a:pPr>
+              <a:buNone/>
+            </a:pPr>
+            <a:r>
+              <a:rPr lang="en-US" sz="2200" b="1" dirty="0" smtClean="0">
+                <a:solidFill>
+                  <a:srgbClr val="0070C0"/>
+                </a:solidFill>
+                <a:latin typeface="Times New Roman" panose="02020603050405020304" pitchFamily="18" charset="0"/>
+                <a:cs typeface="Times New Roman" panose="02020603050405020304" pitchFamily="18" charset="0"/>
+              </a:rPr>
+              <a:t>	DROP USUARIO[NOMBRE DEL USUARIO];</a:t>
+            </a:r>
+          </a:p>
+          <a:p>
+            <a:pPr>
+              <a:buNone/>
+            </a:pPr>
+            <a:r>
+              <a:rPr lang="en-US" sz="2200" b="1" dirty="0" smtClean="0">
+                <a:solidFill>
+                  <a:srgbClr val="0070C0"/>
+                </a:solidFill>
+                <a:latin typeface="Times New Roman" panose="02020603050405020304" pitchFamily="18" charset="0"/>
+                <a:cs typeface="Times New Roman" panose="02020603050405020304" pitchFamily="18" charset="0"/>
+              </a:rPr>
+              <a:t>	DROP TABLE[NOMBRE DE LA TABLA];</a:t>
+            </a:r>
+            <a:endParaRPr lang="es-BO" sz="2200" b="1" dirty="0" smtClean="0">
+              <a:solidFill>
+                <a:srgbClr val="0070C0"/>
+              </a:solidFill>
+              <a:latin typeface="Times New Roman" panose="02020603050405020304" pitchFamily="18" charset="0"/>
+              <a:cs typeface="Times New Roman" panose="02020603050405020304" pitchFamily="18" charset="0"/>
+            </a:endParaRPr>
+          </a:p>
+          <a:p>
+            <a:r>
+              <a:rPr lang="es-BO" sz="2200" dirty="0" smtClean="0">
+                <a:latin typeface="Times New Roman" panose="02020603050405020304" pitchFamily="18" charset="0"/>
+                <a:cs typeface="Times New Roman" panose="02020603050405020304" pitchFamily="18" charset="0"/>
+              </a:rPr>
+              <a:t>Para poder modificar datos de un objeto ya sea base de datos usuarios, tablas se utiliza la sentencia ALTER</a:t>
+            </a:r>
+          </a:p>
+          <a:p>
+            <a:pPr>
+              <a:buNone/>
+            </a:pPr>
+            <a:r>
+              <a:rPr lang="es-BO" sz="2200" b="1" dirty="0" smtClean="0">
+                <a:latin typeface="Times New Roman" panose="02020603050405020304" pitchFamily="18" charset="0"/>
+                <a:cs typeface="Times New Roman" panose="02020603050405020304" pitchFamily="18" charset="0"/>
+              </a:rPr>
+              <a:t>	</a:t>
+            </a:r>
+            <a:r>
+              <a:rPr lang="es-BO" sz="2200" b="1" dirty="0" smtClean="0">
+                <a:solidFill>
+                  <a:srgbClr val="0070C0"/>
+                </a:solidFill>
+                <a:latin typeface="Times New Roman" panose="02020603050405020304" pitchFamily="18" charset="0"/>
+                <a:cs typeface="Times New Roman" panose="02020603050405020304" pitchFamily="18" charset="0"/>
+              </a:rPr>
+              <a:t>ALTER  USER prueba RENAME prueba1;</a:t>
+            </a:r>
+          </a:p>
+          <a:p>
+            <a:pPr>
+              <a:buNone/>
+            </a:pPr>
+            <a:r>
+              <a:rPr lang="es-BO" sz="2200" b="1" dirty="0" smtClean="0">
+                <a:solidFill>
+                  <a:srgbClr val="0070C0"/>
+                </a:solidFill>
+                <a:latin typeface="Times New Roman" panose="02020603050405020304" pitchFamily="18" charset="0"/>
+                <a:cs typeface="Times New Roman" panose="02020603050405020304" pitchFamily="18" charset="0"/>
+              </a:rPr>
+              <a:t>	ALTER  ROLE "prueba" PASSWORD 'prueba';</a:t>
+            </a:r>
+          </a:p>
+          <a:p>
+            <a:pPr>
+              <a:buNone/>
+            </a:pPr>
+            <a:r>
+              <a:rPr lang="es-BO" sz="2200" b="1" dirty="0" smtClean="0">
+                <a:solidFill>
+                  <a:srgbClr val="0070C0"/>
+                </a:solidFill>
+                <a:latin typeface="Times New Roman" panose="02020603050405020304" pitchFamily="18" charset="0"/>
+                <a:cs typeface="Times New Roman" panose="02020603050405020304" pitchFamily="18" charset="0"/>
+              </a:rPr>
+              <a:t>	ALTER  USER "prueba" PASSWORD 'prueba';</a:t>
+            </a:r>
+          </a:p>
+          <a:p>
+            <a:pPr>
+              <a:buNone/>
+            </a:pPr>
+            <a:r>
+              <a:rPr lang="es-BO" sz="2200" b="1" dirty="0" smtClean="0">
+                <a:solidFill>
+                  <a:srgbClr val="0070C0"/>
+                </a:solidFill>
+                <a:latin typeface="Times New Roman" panose="02020603050405020304" pitchFamily="18" charset="0"/>
+                <a:cs typeface="Times New Roman" panose="02020603050405020304" pitchFamily="18" charset="0"/>
+              </a:rPr>
+              <a:t>	ALTER  DATABASE prueba RENAME prueba1;</a:t>
+            </a:r>
+          </a:p>
+          <a:p>
+            <a:pPr>
+              <a:buNone/>
+            </a:pPr>
+            <a:r>
+              <a:rPr lang="es-BO" sz="2200" b="1" dirty="0" smtClean="0">
+                <a:solidFill>
+                  <a:srgbClr val="0070C0"/>
+                </a:solidFill>
+                <a:latin typeface="Times New Roman" panose="02020603050405020304" pitchFamily="18" charset="0"/>
+                <a:cs typeface="Times New Roman" panose="02020603050405020304" pitchFamily="18" charset="0"/>
+              </a:rPr>
+              <a:t>	ALTER  TABLE prueba RENAME prueba1;</a:t>
+            </a:r>
+          </a:p>
+          <a:p>
+            <a:pPr>
+              <a:buNone/>
+            </a:pPr>
+            <a:endParaRPr lang="es-BO" dirty="0" smtClean="0"/>
+          </a:p>
+          <a:p>
+            <a:pPr>
+              <a:buNone/>
+            </a:pPr>
+            <a:endParaRPr lang="es-BO" dirty="0" smtClean="0"/>
+          </a:p>
+          <a:p>
+            <a:pPr>
+              <a:buNone/>
+            </a:pPr>
+            <a:endParaRPr lang="es-BO" dirty="0" smtClean="0"/>
+          </a:p>
+          <a:p>
+            <a:pPr>
+              <a:buNone/>
+            </a:pPr>
+            <a:endParaRPr lang="es-BO" dirty="0"/>
+          </a:p>
+        </p:txBody>
+      </p:sp>
+      <p:sp>
+        <p:nvSpPr>
+          <p:cNvPr id="5" name="13 Rectángulo"/>
+          <p:cNvSpPr/>
+          <p:nvPr/>
+        </p:nvSpPr>
+        <p:spPr>
+          <a:xfrm>
+            <a:off x="1355928" y="332656"/>
+            <a:ext cx="6795450" cy="615553"/>
+          </a:xfrm>
+          <a:prstGeom prst="rect">
+            <a:avLst/>
+          </a:prstGeom>
+          <a:noFill/>
+        </p:spPr>
+        <p:txBody>
+          <a:bodyPr wrap="none" lIns="91440" tIns="45720" rIns="91440" bIns="45720">
+            <a:spAutoFit/>
+          </a:bodyPr>
+          <a:lstStyle/>
+          <a:p>
+            <a:pPr algn="ctr"/>
+            <a:r>
+              <a:rPr lang="es-ES" sz="3400" b="1" spc="50" dirty="0" smtClean="0">
+                <a:ln w="0"/>
+                <a:solidFill>
+                  <a:srgbClr val="C00000"/>
+                </a:solidFill>
+                <a:effectLst>
+                  <a:innerShdw blurRad="63500" dist="50800" dir="13500000">
+                    <a:srgbClr val="000000">
+                      <a:alpha val="50000"/>
+                    </a:srgbClr>
+                  </a:innerShdw>
+                </a:effectLst>
+                <a:latin typeface="Times New Roman" panose="02020603050405020304" pitchFamily="18" charset="0"/>
+                <a:cs typeface="Times New Roman" panose="02020603050405020304" pitchFamily="18" charset="0"/>
+              </a:rPr>
+              <a:t>POSTGRES:ADMINISTRACION</a:t>
+            </a:r>
+            <a:endParaRPr lang="es-BO" sz="3400" b="1" spc="50" dirty="0">
+              <a:ln w="0"/>
+              <a:solidFill>
+                <a:srgbClr val="C00000"/>
+              </a:solidFill>
+              <a:effectLst>
+                <a:innerShdw blurRad="63500" dist="50800" dir="13500000">
+                  <a:srgbClr val="000000">
+                    <a:alpha val="50000"/>
+                  </a:srgbClr>
+                </a:innerShdw>
+              </a:effectLst>
+              <a:latin typeface="Times New Roman" panose="02020603050405020304" pitchFamily="18" charset="0"/>
+              <a:cs typeface="Times New Roman" panose="02020603050405020304" pitchFamily="18" charset="0"/>
+            </a:endParaRPr>
+          </a:p>
+        </p:txBody>
+      </p:sp>
+    </p:spTree>
+    <p:extLst>
+      <p:ext uri="{BB962C8B-B14F-4D97-AF65-F5344CB8AC3E}">
+        <p14:creationId xmlns:p14="http://schemas.microsoft.com/office/powerpoint/2010/main" val="656651701"/>
       </p:ext>
     </p:extLst>
   </p:cSld>
@@ -12437,6 +15356,13 @@
   <p:clrMapOvr>
     <a:masterClrMapping/>
   </p:clrMapOvr>
+  <p:timing>
+    <p:tnLst>
+      <p:par>
+        <p:cTn id="1" dur="indefinite" restart="never" nodeType="tmRoot"/>
+      </p:par>
+    </p:tnLst>
+  </p:timing>
 </p:sld>
 </file>
 

</xml_diff>